<commit_message>
Fixed the GLM strangeness
</commit_message>
<xml_diff>
--- a/activities/intro_to_bayes/BayesKeys.pptx
+++ b/activities/intro_to_bayes/BayesKeys.pptx
@@ -5,7 +5,8 @@
     <p:sldMasterId id="2147483648" r:id="rId1"/>
   </p:sldMasterIdLst>
   <p:sldIdLst>
-    <p:sldId id="257" r:id="rId2"/>
+    <p:sldId id="258" r:id="rId2"/>
+    <p:sldId id="257" r:id="rId3"/>
   </p:sldIdLst>
   <p:sldSz cx="12192000" cy="6858000"/>
   <p:notesSz cx="6858000" cy="9144000"/>
@@ -104,6 +105,11 @@
       </a:defRPr>
     </a:lvl9pPr>
   </p:defaultTextStyle>
+  <p:extLst>
+    <p:ext uri="{EFAFB233-063F-42B5-8137-9DF3F51BA10A}">
+      <p15:sldGuideLst xmlns:p15="http://schemas.microsoft.com/office/powerpoint/2012/main"/>
+    </p:ext>
+  </p:extLst>
 </p:presentation>
 </file>
 
@@ -238,7 +244,7 @@
           <a:p>
             <a:fld id="{9FC5ACED-37C2-5A48-B6D6-2482EC34C97B}" type="datetimeFigureOut">
               <a:rPr lang="en-US" smtClean="0"/>
-              <a:t>2/1/17</a:t>
+              <a:t>9/11/17</a:t>
             </a:fld>
             <a:endParaRPr lang="en-US"/>
           </a:p>
@@ -408,7 +414,7 @@
           <a:p>
             <a:fld id="{9FC5ACED-37C2-5A48-B6D6-2482EC34C97B}" type="datetimeFigureOut">
               <a:rPr lang="en-US" smtClean="0"/>
-              <a:t>2/1/17</a:t>
+              <a:t>9/11/17</a:t>
             </a:fld>
             <a:endParaRPr lang="en-US"/>
           </a:p>
@@ -588,7 +594,7 @@
           <a:p>
             <a:fld id="{9FC5ACED-37C2-5A48-B6D6-2482EC34C97B}" type="datetimeFigureOut">
               <a:rPr lang="en-US" smtClean="0"/>
-              <a:t>2/1/17</a:t>
+              <a:t>9/11/17</a:t>
             </a:fld>
             <a:endParaRPr lang="en-US"/>
           </a:p>
@@ -758,7 +764,7 @@
           <a:p>
             <a:fld id="{9FC5ACED-37C2-5A48-B6D6-2482EC34C97B}" type="datetimeFigureOut">
               <a:rPr lang="en-US" smtClean="0"/>
-              <a:t>2/1/17</a:t>
+              <a:t>9/11/17</a:t>
             </a:fld>
             <a:endParaRPr lang="en-US"/>
           </a:p>
@@ -1004,7 +1010,7 @@
           <a:p>
             <a:fld id="{9FC5ACED-37C2-5A48-B6D6-2482EC34C97B}" type="datetimeFigureOut">
               <a:rPr lang="en-US" smtClean="0"/>
-              <a:t>2/1/17</a:t>
+              <a:t>9/11/17</a:t>
             </a:fld>
             <a:endParaRPr lang="en-US"/>
           </a:p>
@@ -1236,7 +1242,7 @@
           <a:p>
             <a:fld id="{9FC5ACED-37C2-5A48-B6D6-2482EC34C97B}" type="datetimeFigureOut">
               <a:rPr lang="en-US" smtClean="0"/>
-              <a:t>2/1/17</a:t>
+              <a:t>9/11/17</a:t>
             </a:fld>
             <a:endParaRPr lang="en-US"/>
           </a:p>
@@ -1603,7 +1609,7 @@
           <a:p>
             <a:fld id="{9FC5ACED-37C2-5A48-B6D6-2482EC34C97B}" type="datetimeFigureOut">
               <a:rPr lang="en-US" smtClean="0"/>
-              <a:t>2/1/17</a:t>
+              <a:t>9/11/17</a:t>
             </a:fld>
             <a:endParaRPr lang="en-US"/>
           </a:p>
@@ -1721,7 +1727,7 @@
           <a:p>
             <a:fld id="{9FC5ACED-37C2-5A48-B6D6-2482EC34C97B}" type="datetimeFigureOut">
               <a:rPr lang="en-US" smtClean="0"/>
-              <a:t>2/1/17</a:t>
+              <a:t>9/11/17</a:t>
             </a:fld>
             <a:endParaRPr lang="en-US"/>
           </a:p>
@@ -1816,7 +1822,7 @@
           <a:p>
             <a:fld id="{9FC5ACED-37C2-5A48-B6D6-2482EC34C97B}" type="datetimeFigureOut">
               <a:rPr lang="en-US" smtClean="0"/>
-              <a:t>2/1/17</a:t>
+              <a:t>9/11/17</a:t>
             </a:fld>
             <a:endParaRPr lang="en-US"/>
           </a:p>
@@ -2093,7 +2099,7 @@
           <a:p>
             <a:fld id="{9FC5ACED-37C2-5A48-B6D6-2482EC34C97B}" type="datetimeFigureOut">
               <a:rPr lang="en-US" smtClean="0"/>
-              <a:t>2/1/17</a:t>
+              <a:t>9/11/17</a:t>
             </a:fld>
             <a:endParaRPr lang="en-US"/>
           </a:p>
@@ -2346,7 +2352,7 @@
           <a:p>
             <a:fld id="{9FC5ACED-37C2-5A48-B6D6-2482EC34C97B}" type="datetimeFigureOut">
               <a:rPr lang="en-US" smtClean="0"/>
-              <a:t>2/1/17</a:t>
+              <a:t>9/11/17</a:t>
             </a:fld>
             <a:endParaRPr lang="en-US"/>
           </a:p>
@@ -2559,7 +2565,7 @@
           <a:p>
             <a:fld id="{9FC5ACED-37C2-5A48-B6D6-2482EC34C97B}" type="datetimeFigureOut">
               <a:rPr lang="en-US" smtClean="0"/>
-              <a:t>2/1/17</a:t>
+              <a:t>9/11/17</a:t>
             </a:fld>
             <a:endParaRPr lang="en-US"/>
           </a:p>
@@ -2948,6 +2954,2325 @@
 </file>
 
 <file path=ppt/slides/slide1.xml><?xml version="1.0" encoding="utf-8"?>
+<p:sld xmlns:a="http://schemas.openxmlformats.org/drawingml/2006/main" xmlns:r="http://schemas.openxmlformats.org/officeDocument/2006/relationships" xmlns:p="http://schemas.openxmlformats.org/presentationml/2006/main">
+  <p:cSld>
+    <p:spTree>
+      <p:nvGrpSpPr>
+        <p:cNvPr id="1" name=""/>
+        <p:cNvGrpSpPr/>
+        <p:nvPr/>
+      </p:nvGrpSpPr>
+      <p:grpSpPr>
+        <a:xfrm>
+          <a:off x="0" y="0"/>
+          <a:ext cx="0" cy="0"/>
+          <a:chOff x="0" y="0"/>
+          <a:chExt cx="0" cy="0"/>
+        </a:xfrm>
+      </p:grpSpPr>
+      <p:pic>
+        <p:nvPicPr>
+          <p:cNvPr id="4" name="Picture 4" descr="houseplan"/>
+          <p:cNvPicPr>
+            <a:picLocks noChangeAspect="1" noChangeArrowheads="1"/>
+          </p:cNvPicPr>
+          <p:nvPr/>
+        </p:nvPicPr>
+        <p:blipFill>
+          <a:blip r:embed="rId2">
+            <a:extLst>
+              <a:ext uri="{28A0092B-C50C-407E-A947-70E740481C1C}">
+                <a14:useLocalDpi xmlns:a14="http://schemas.microsoft.com/office/drawing/2010/main" val="0"/>
+              </a:ext>
+            </a:extLst>
+          </a:blip>
+          <a:srcRect l="17500" t="13486" r="20000" b="12379"/>
+          <a:stretch>
+            <a:fillRect/>
+          </a:stretch>
+        </p:blipFill>
+        <p:spPr bwMode="auto">
+          <a:xfrm>
+            <a:off x="1600200" y="1219200"/>
+            <a:ext cx="3810000" cy="5105400"/>
+          </a:xfrm>
+          <a:prstGeom prst="rect">
+            <a:avLst/>
+          </a:prstGeom>
+          <a:noFill/>
+          <a:ln>
+            <a:noFill/>
+          </a:ln>
+          <a:extLst>
+            <a:ext uri="{909E8E84-426E-40DD-AFC4-6F175D3DCCD1}">
+              <a14:hiddenFill xmlns:a14="http://schemas.microsoft.com/office/drawing/2010/main">
+                <a:solidFill>
+                  <a:srgbClr val="FFFFFF"/>
+                </a:solidFill>
+              </a14:hiddenFill>
+            </a:ext>
+            <a:ext uri="{91240B29-F687-4F45-9708-019B960494DF}">
+              <a14:hiddenLine xmlns:a14="http://schemas.microsoft.com/office/drawing/2010/main" w="9525">
+                <a:solidFill>
+                  <a:srgbClr val="000000"/>
+                </a:solidFill>
+                <a:miter lim="800000"/>
+                <a:headEnd/>
+                <a:tailEnd/>
+              </a14:hiddenLine>
+            </a:ext>
+          </a:extLst>
+        </p:spPr>
+      </p:pic>
+      <p:sp>
+        <p:nvSpPr>
+          <p:cNvPr id="5" name="Text Box 5"/>
+          <p:cNvSpPr txBox="1">
+            <a:spLocks noChangeArrowheads="1"/>
+          </p:cNvSpPr>
+          <p:nvPr/>
+        </p:nvSpPr>
+        <p:spPr bwMode="auto">
+          <a:xfrm rot="-2700000">
+            <a:off x="5888038" y="5832476"/>
+            <a:ext cx="641350" cy="366713"/>
+          </a:xfrm>
+          <a:prstGeom prst="rect">
+            <a:avLst/>
+          </a:prstGeom>
+          <a:noFill/>
+          <a:ln>
+            <a:noFill/>
+          </a:ln>
+          <a:extLst>
+            <a:ext uri="{909E8E84-426E-40DD-AFC4-6F175D3DCCD1}">
+              <a14:hiddenFill xmlns:a14="http://schemas.microsoft.com/office/drawing/2010/main">
+                <a:solidFill>
+                  <a:srgbClr val="FFFFFF"/>
+                </a:solidFill>
+              </a14:hiddenFill>
+            </a:ext>
+            <a:ext uri="{91240B29-F687-4F45-9708-019B960494DF}">
+              <a14:hiddenLine xmlns:a14="http://schemas.microsoft.com/office/drawing/2010/main" w="9525">
+                <a:solidFill>
+                  <a:srgbClr val="000000"/>
+                </a:solidFill>
+                <a:miter lim="800000"/>
+                <a:headEnd/>
+                <a:tailEnd/>
+              </a14:hiddenLine>
+            </a:ext>
+          </a:extLst>
+        </p:spPr>
+        <p:txBody>
+          <a:bodyPr wrap="none">
+            <a:spAutoFit/>
+          </a:bodyPr>
+          <a:lstStyle>
+            <a:lvl1pPr eaLnBrk="0" hangingPunct="0">
+              <a:defRPr sz="2400" i="1">
+                <a:solidFill>
+                  <a:schemeClr val="tx1"/>
+                </a:solidFill>
+                <a:latin typeface="Arial" charset="0"/>
+                <a:ea typeface="ＭＳ Ｐゴシック" charset="-128"/>
+              </a:defRPr>
+            </a:lvl1pPr>
+            <a:lvl2pPr marL="37931725" indent="-37474525" eaLnBrk="0" hangingPunct="0">
+              <a:defRPr sz="2400" i="1">
+                <a:solidFill>
+                  <a:schemeClr val="tx1"/>
+                </a:solidFill>
+                <a:latin typeface="Arial" charset="0"/>
+                <a:ea typeface="ＭＳ Ｐゴシック" charset="-128"/>
+              </a:defRPr>
+            </a:lvl2pPr>
+            <a:lvl3pPr eaLnBrk="0" hangingPunct="0">
+              <a:defRPr sz="2400" i="1">
+                <a:solidFill>
+                  <a:schemeClr val="tx1"/>
+                </a:solidFill>
+                <a:latin typeface="Arial" charset="0"/>
+                <a:ea typeface="ＭＳ Ｐゴシック" charset="-128"/>
+              </a:defRPr>
+            </a:lvl3pPr>
+            <a:lvl4pPr eaLnBrk="0" hangingPunct="0">
+              <a:defRPr sz="2400" i="1">
+                <a:solidFill>
+                  <a:schemeClr val="tx1"/>
+                </a:solidFill>
+                <a:latin typeface="Arial" charset="0"/>
+                <a:ea typeface="ＭＳ Ｐゴシック" charset="-128"/>
+              </a:defRPr>
+            </a:lvl4pPr>
+            <a:lvl5pPr eaLnBrk="0" hangingPunct="0">
+              <a:defRPr sz="2400" i="1">
+                <a:solidFill>
+                  <a:schemeClr val="tx1"/>
+                </a:solidFill>
+                <a:latin typeface="Arial" charset="0"/>
+                <a:ea typeface="ＭＳ Ｐゴシック" charset="-128"/>
+              </a:defRPr>
+            </a:lvl5pPr>
+            <a:lvl6pPr marL="457200" eaLnBrk="0" fontAlgn="base" hangingPunct="0">
+              <a:spcBef>
+                <a:spcPct val="0"/>
+              </a:spcBef>
+              <a:spcAft>
+                <a:spcPct val="0"/>
+              </a:spcAft>
+              <a:defRPr sz="2400" i="1">
+                <a:solidFill>
+                  <a:schemeClr val="tx1"/>
+                </a:solidFill>
+                <a:latin typeface="Arial" charset="0"/>
+                <a:ea typeface="ＭＳ Ｐゴシック" charset="-128"/>
+              </a:defRPr>
+            </a:lvl6pPr>
+            <a:lvl7pPr marL="914400" eaLnBrk="0" fontAlgn="base" hangingPunct="0">
+              <a:spcBef>
+                <a:spcPct val="0"/>
+              </a:spcBef>
+              <a:spcAft>
+                <a:spcPct val="0"/>
+              </a:spcAft>
+              <a:defRPr sz="2400" i="1">
+                <a:solidFill>
+                  <a:schemeClr val="tx1"/>
+                </a:solidFill>
+                <a:latin typeface="Arial" charset="0"/>
+                <a:ea typeface="ＭＳ Ｐゴシック" charset="-128"/>
+              </a:defRPr>
+            </a:lvl7pPr>
+            <a:lvl8pPr marL="1371600" eaLnBrk="0" fontAlgn="base" hangingPunct="0">
+              <a:spcBef>
+                <a:spcPct val="0"/>
+              </a:spcBef>
+              <a:spcAft>
+                <a:spcPct val="0"/>
+              </a:spcAft>
+              <a:defRPr sz="2400" i="1">
+                <a:solidFill>
+                  <a:schemeClr val="tx1"/>
+                </a:solidFill>
+                <a:latin typeface="Arial" charset="0"/>
+                <a:ea typeface="ＭＳ Ｐゴシック" charset="-128"/>
+              </a:defRPr>
+            </a:lvl8pPr>
+            <a:lvl9pPr marL="1828800" eaLnBrk="0" fontAlgn="base" hangingPunct="0">
+              <a:spcBef>
+                <a:spcPct val="0"/>
+              </a:spcBef>
+              <a:spcAft>
+                <a:spcPct val="0"/>
+              </a:spcAft>
+              <a:defRPr sz="2400" i="1">
+                <a:solidFill>
+                  <a:schemeClr val="tx1"/>
+                </a:solidFill>
+                <a:latin typeface="Arial" charset="0"/>
+                <a:ea typeface="ＭＳ Ｐゴシック" charset="-128"/>
+              </a:defRPr>
+            </a:lvl9pPr>
+          </a:lstStyle>
+          <a:p>
+            <a:pPr eaLnBrk="1" hangingPunct="1"/>
+            <a:r>
+              <a:rPr lang="en-US" altLang="x-none" sz="1800" b="1"/>
+              <a:t>BR1</a:t>
+            </a:r>
+          </a:p>
+        </p:txBody>
+      </p:sp>
+      <p:sp>
+        <p:nvSpPr>
+          <p:cNvPr id="6" name="Text Box 6"/>
+          <p:cNvSpPr txBox="1">
+            <a:spLocks noChangeArrowheads="1"/>
+          </p:cNvSpPr>
+          <p:nvPr/>
+        </p:nvSpPr>
+        <p:spPr bwMode="auto">
+          <a:xfrm rot="-2700000">
+            <a:off x="6367463" y="5832476"/>
+            <a:ext cx="641350" cy="366713"/>
+          </a:xfrm>
+          <a:prstGeom prst="rect">
+            <a:avLst/>
+          </a:prstGeom>
+          <a:noFill/>
+          <a:ln>
+            <a:noFill/>
+          </a:ln>
+          <a:extLst>
+            <a:ext uri="{909E8E84-426E-40DD-AFC4-6F175D3DCCD1}">
+              <a14:hiddenFill xmlns:a14="http://schemas.microsoft.com/office/drawing/2010/main">
+                <a:solidFill>
+                  <a:srgbClr val="FFFFFF"/>
+                </a:solidFill>
+              </a14:hiddenFill>
+            </a:ext>
+            <a:ext uri="{91240B29-F687-4F45-9708-019B960494DF}">
+              <a14:hiddenLine xmlns:a14="http://schemas.microsoft.com/office/drawing/2010/main" w="9525">
+                <a:solidFill>
+                  <a:srgbClr val="000000"/>
+                </a:solidFill>
+                <a:miter lim="800000"/>
+                <a:headEnd/>
+                <a:tailEnd/>
+              </a14:hiddenLine>
+            </a:ext>
+          </a:extLst>
+        </p:spPr>
+        <p:txBody>
+          <a:bodyPr wrap="none">
+            <a:spAutoFit/>
+          </a:bodyPr>
+          <a:lstStyle>
+            <a:lvl1pPr eaLnBrk="0" hangingPunct="0">
+              <a:defRPr sz="2400" i="1">
+                <a:solidFill>
+                  <a:schemeClr val="tx1"/>
+                </a:solidFill>
+                <a:latin typeface="Arial" charset="0"/>
+                <a:ea typeface="ＭＳ Ｐゴシック" charset="-128"/>
+              </a:defRPr>
+            </a:lvl1pPr>
+            <a:lvl2pPr marL="37931725" indent="-37474525" eaLnBrk="0" hangingPunct="0">
+              <a:defRPr sz="2400" i="1">
+                <a:solidFill>
+                  <a:schemeClr val="tx1"/>
+                </a:solidFill>
+                <a:latin typeface="Arial" charset="0"/>
+                <a:ea typeface="ＭＳ Ｐゴシック" charset="-128"/>
+              </a:defRPr>
+            </a:lvl2pPr>
+            <a:lvl3pPr eaLnBrk="0" hangingPunct="0">
+              <a:defRPr sz="2400" i="1">
+                <a:solidFill>
+                  <a:schemeClr val="tx1"/>
+                </a:solidFill>
+                <a:latin typeface="Arial" charset="0"/>
+                <a:ea typeface="ＭＳ Ｐゴシック" charset="-128"/>
+              </a:defRPr>
+            </a:lvl3pPr>
+            <a:lvl4pPr eaLnBrk="0" hangingPunct="0">
+              <a:defRPr sz="2400" i="1">
+                <a:solidFill>
+                  <a:schemeClr val="tx1"/>
+                </a:solidFill>
+                <a:latin typeface="Arial" charset="0"/>
+                <a:ea typeface="ＭＳ Ｐゴシック" charset="-128"/>
+              </a:defRPr>
+            </a:lvl4pPr>
+            <a:lvl5pPr eaLnBrk="0" hangingPunct="0">
+              <a:defRPr sz="2400" i="1">
+                <a:solidFill>
+                  <a:schemeClr val="tx1"/>
+                </a:solidFill>
+                <a:latin typeface="Arial" charset="0"/>
+                <a:ea typeface="ＭＳ Ｐゴシック" charset="-128"/>
+              </a:defRPr>
+            </a:lvl5pPr>
+            <a:lvl6pPr marL="457200" eaLnBrk="0" fontAlgn="base" hangingPunct="0">
+              <a:spcBef>
+                <a:spcPct val="0"/>
+              </a:spcBef>
+              <a:spcAft>
+                <a:spcPct val="0"/>
+              </a:spcAft>
+              <a:defRPr sz="2400" i="1">
+                <a:solidFill>
+                  <a:schemeClr val="tx1"/>
+                </a:solidFill>
+                <a:latin typeface="Arial" charset="0"/>
+                <a:ea typeface="ＭＳ Ｐゴシック" charset="-128"/>
+              </a:defRPr>
+            </a:lvl6pPr>
+            <a:lvl7pPr marL="914400" eaLnBrk="0" fontAlgn="base" hangingPunct="0">
+              <a:spcBef>
+                <a:spcPct val="0"/>
+              </a:spcBef>
+              <a:spcAft>
+                <a:spcPct val="0"/>
+              </a:spcAft>
+              <a:defRPr sz="2400" i="1">
+                <a:solidFill>
+                  <a:schemeClr val="tx1"/>
+                </a:solidFill>
+                <a:latin typeface="Arial" charset="0"/>
+                <a:ea typeface="ＭＳ Ｐゴシック" charset="-128"/>
+              </a:defRPr>
+            </a:lvl7pPr>
+            <a:lvl8pPr marL="1371600" eaLnBrk="0" fontAlgn="base" hangingPunct="0">
+              <a:spcBef>
+                <a:spcPct val="0"/>
+              </a:spcBef>
+              <a:spcAft>
+                <a:spcPct val="0"/>
+              </a:spcAft>
+              <a:defRPr sz="2400" i="1">
+                <a:solidFill>
+                  <a:schemeClr val="tx1"/>
+                </a:solidFill>
+                <a:latin typeface="Arial" charset="0"/>
+                <a:ea typeface="ＭＳ Ｐゴシック" charset="-128"/>
+              </a:defRPr>
+            </a:lvl8pPr>
+            <a:lvl9pPr marL="1828800" eaLnBrk="0" fontAlgn="base" hangingPunct="0">
+              <a:spcBef>
+                <a:spcPct val="0"/>
+              </a:spcBef>
+              <a:spcAft>
+                <a:spcPct val="0"/>
+              </a:spcAft>
+              <a:defRPr sz="2400" i="1">
+                <a:solidFill>
+                  <a:schemeClr val="tx1"/>
+                </a:solidFill>
+                <a:latin typeface="Arial" charset="0"/>
+                <a:ea typeface="ＭＳ Ｐゴシック" charset="-128"/>
+              </a:defRPr>
+            </a:lvl9pPr>
+          </a:lstStyle>
+          <a:p>
+            <a:pPr eaLnBrk="1" hangingPunct="1"/>
+            <a:r>
+              <a:rPr lang="en-US" altLang="x-none" sz="1800" b="1"/>
+              <a:t>BR2</a:t>
+            </a:r>
+          </a:p>
+        </p:txBody>
+      </p:sp>
+      <p:sp>
+        <p:nvSpPr>
+          <p:cNvPr id="7" name="Text Box 7"/>
+          <p:cNvSpPr txBox="1">
+            <a:spLocks noChangeArrowheads="1"/>
+          </p:cNvSpPr>
+          <p:nvPr/>
+        </p:nvSpPr>
+        <p:spPr bwMode="auto">
+          <a:xfrm rot="-2700000">
+            <a:off x="6848475" y="5832476"/>
+            <a:ext cx="641350" cy="366713"/>
+          </a:xfrm>
+          <a:prstGeom prst="rect">
+            <a:avLst/>
+          </a:prstGeom>
+          <a:noFill/>
+          <a:ln>
+            <a:noFill/>
+          </a:ln>
+          <a:extLst>
+            <a:ext uri="{909E8E84-426E-40DD-AFC4-6F175D3DCCD1}">
+              <a14:hiddenFill xmlns:a14="http://schemas.microsoft.com/office/drawing/2010/main">
+                <a:solidFill>
+                  <a:srgbClr val="FFFFFF"/>
+                </a:solidFill>
+              </a14:hiddenFill>
+            </a:ext>
+            <a:ext uri="{91240B29-F687-4F45-9708-019B960494DF}">
+              <a14:hiddenLine xmlns:a14="http://schemas.microsoft.com/office/drawing/2010/main" w="9525">
+                <a:solidFill>
+                  <a:srgbClr val="000000"/>
+                </a:solidFill>
+                <a:miter lim="800000"/>
+                <a:headEnd/>
+                <a:tailEnd/>
+              </a14:hiddenLine>
+            </a:ext>
+          </a:extLst>
+        </p:spPr>
+        <p:txBody>
+          <a:bodyPr wrap="none">
+            <a:spAutoFit/>
+          </a:bodyPr>
+          <a:lstStyle>
+            <a:lvl1pPr eaLnBrk="0" hangingPunct="0">
+              <a:defRPr sz="2400" i="1">
+                <a:solidFill>
+                  <a:schemeClr val="tx1"/>
+                </a:solidFill>
+                <a:latin typeface="Arial" charset="0"/>
+                <a:ea typeface="ＭＳ Ｐゴシック" charset="-128"/>
+              </a:defRPr>
+            </a:lvl1pPr>
+            <a:lvl2pPr marL="37931725" indent="-37474525" eaLnBrk="0" hangingPunct="0">
+              <a:defRPr sz="2400" i="1">
+                <a:solidFill>
+                  <a:schemeClr val="tx1"/>
+                </a:solidFill>
+                <a:latin typeface="Arial" charset="0"/>
+                <a:ea typeface="ＭＳ Ｐゴシック" charset="-128"/>
+              </a:defRPr>
+            </a:lvl2pPr>
+            <a:lvl3pPr eaLnBrk="0" hangingPunct="0">
+              <a:defRPr sz="2400" i="1">
+                <a:solidFill>
+                  <a:schemeClr val="tx1"/>
+                </a:solidFill>
+                <a:latin typeface="Arial" charset="0"/>
+                <a:ea typeface="ＭＳ Ｐゴシック" charset="-128"/>
+              </a:defRPr>
+            </a:lvl3pPr>
+            <a:lvl4pPr eaLnBrk="0" hangingPunct="0">
+              <a:defRPr sz="2400" i="1">
+                <a:solidFill>
+                  <a:schemeClr val="tx1"/>
+                </a:solidFill>
+                <a:latin typeface="Arial" charset="0"/>
+                <a:ea typeface="ＭＳ Ｐゴシック" charset="-128"/>
+              </a:defRPr>
+            </a:lvl4pPr>
+            <a:lvl5pPr eaLnBrk="0" hangingPunct="0">
+              <a:defRPr sz="2400" i="1">
+                <a:solidFill>
+                  <a:schemeClr val="tx1"/>
+                </a:solidFill>
+                <a:latin typeface="Arial" charset="0"/>
+                <a:ea typeface="ＭＳ Ｐゴシック" charset="-128"/>
+              </a:defRPr>
+            </a:lvl5pPr>
+            <a:lvl6pPr marL="457200" eaLnBrk="0" fontAlgn="base" hangingPunct="0">
+              <a:spcBef>
+                <a:spcPct val="0"/>
+              </a:spcBef>
+              <a:spcAft>
+                <a:spcPct val="0"/>
+              </a:spcAft>
+              <a:defRPr sz="2400" i="1">
+                <a:solidFill>
+                  <a:schemeClr val="tx1"/>
+                </a:solidFill>
+                <a:latin typeface="Arial" charset="0"/>
+                <a:ea typeface="ＭＳ Ｐゴシック" charset="-128"/>
+              </a:defRPr>
+            </a:lvl6pPr>
+            <a:lvl7pPr marL="914400" eaLnBrk="0" fontAlgn="base" hangingPunct="0">
+              <a:spcBef>
+                <a:spcPct val="0"/>
+              </a:spcBef>
+              <a:spcAft>
+                <a:spcPct val="0"/>
+              </a:spcAft>
+              <a:defRPr sz="2400" i="1">
+                <a:solidFill>
+                  <a:schemeClr val="tx1"/>
+                </a:solidFill>
+                <a:latin typeface="Arial" charset="0"/>
+                <a:ea typeface="ＭＳ Ｐゴシック" charset="-128"/>
+              </a:defRPr>
+            </a:lvl7pPr>
+            <a:lvl8pPr marL="1371600" eaLnBrk="0" fontAlgn="base" hangingPunct="0">
+              <a:spcBef>
+                <a:spcPct val="0"/>
+              </a:spcBef>
+              <a:spcAft>
+                <a:spcPct val="0"/>
+              </a:spcAft>
+              <a:defRPr sz="2400" i="1">
+                <a:solidFill>
+                  <a:schemeClr val="tx1"/>
+                </a:solidFill>
+                <a:latin typeface="Arial" charset="0"/>
+                <a:ea typeface="ＭＳ Ｐゴシック" charset="-128"/>
+              </a:defRPr>
+            </a:lvl8pPr>
+            <a:lvl9pPr marL="1828800" eaLnBrk="0" fontAlgn="base" hangingPunct="0">
+              <a:spcBef>
+                <a:spcPct val="0"/>
+              </a:spcBef>
+              <a:spcAft>
+                <a:spcPct val="0"/>
+              </a:spcAft>
+              <a:defRPr sz="2400" i="1">
+                <a:solidFill>
+                  <a:schemeClr val="tx1"/>
+                </a:solidFill>
+                <a:latin typeface="Arial" charset="0"/>
+                <a:ea typeface="ＭＳ Ｐゴシック" charset="-128"/>
+              </a:defRPr>
+            </a:lvl9pPr>
+          </a:lstStyle>
+          <a:p>
+            <a:pPr eaLnBrk="1" hangingPunct="1"/>
+            <a:r>
+              <a:rPr lang="en-US" altLang="x-none" sz="1800" b="1"/>
+              <a:t>BR3</a:t>
+            </a:r>
+          </a:p>
+        </p:txBody>
+      </p:sp>
+      <p:sp>
+        <p:nvSpPr>
+          <p:cNvPr id="8" name="Text Box 8"/>
+          <p:cNvSpPr txBox="1">
+            <a:spLocks noChangeArrowheads="1"/>
+          </p:cNvSpPr>
+          <p:nvPr/>
+        </p:nvSpPr>
+        <p:spPr bwMode="auto">
+          <a:xfrm rot="-2700000">
+            <a:off x="7327900" y="5832476"/>
+            <a:ext cx="641350" cy="366713"/>
+          </a:xfrm>
+          <a:prstGeom prst="rect">
+            <a:avLst/>
+          </a:prstGeom>
+          <a:noFill/>
+          <a:ln>
+            <a:noFill/>
+          </a:ln>
+          <a:extLst>
+            <a:ext uri="{909E8E84-426E-40DD-AFC4-6F175D3DCCD1}">
+              <a14:hiddenFill xmlns:a14="http://schemas.microsoft.com/office/drawing/2010/main">
+                <a:solidFill>
+                  <a:srgbClr val="FFFFFF"/>
+                </a:solidFill>
+              </a14:hiddenFill>
+            </a:ext>
+            <a:ext uri="{91240B29-F687-4F45-9708-019B960494DF}">
+              <a14:hiddenLine xmlns:a14="http://schemas.microsoft.com/office/drawing/2010/main" w="9525">
+                <a:solidFill>
+                  <a:srgbClr val="000000"/>
+                </a:solidFill>
+                <a:miter lim="800000"/>
+                <a:headEnd/>
+                <a:tailEnd/>
+              </a14:hiddenLine>
+            </a:ext>
+          </a:extLst>
+        </p:spPr>
+        <p:txBody>
+          <a:bodyPr wrap="none">
+            <a:spAutoFit/>
+          </a:bodyPr>
+          <a:lstStyle>
+            <a:lvl1pPr eaLnBrk="0" hangingPunct="0">
+              <a:defRPr sz="2400" i="1">
+                <a:solidFill>
+                  <a:schemeClr val="tx1"/>
+                </a:solidFill>
+                <a:latin typeface="Arial" charset="0"/>
+                <a:ea typeface="ＭＳ Ｐゴシック" charset="-128"/>
+              </a:defRPr>
+            </a:lvl1pPr>
+            <a:lvl2pPr marL="37931725" indent="-37474525" eaLnBrk="0" hangingPunct="0">
+              <a:defRPr sz="2400" i="1">
+                <a:solidFill>
+                  <a:schemeClr val="tx1"/>
+                </a:solidFill>
+                <a:latin typeface="Arial" charset="0"/>
+                <a:ea typeface="ＭＳ Ｐゴシック" charset="-128"/>
+              </a:defRPr>
+            </a:lvl2pPr>
+            <a:lvl3pPr eaLnBrk="0" hangingPunct="0">
+              <a:defRPr sz="2400" i="1">
+                <a:solidFill>
+                  <a:schemeClr val="tx1"/>
+                </a:solidFill>
+                <a:latin typeface="Arial" charset="0"/>
+                <a:ea typeface="ＭＳ Ｐゴシック" charset="-128"/>
+              </a:defRPr>
+            </a:lvl3pPr>
+            <a:lvl4pPr eaLnBrk="0" hangingPunct="0">
+              <a:defRPr sz="2400" i="1">
+                <a:solidFill>
+                  <a:schemeClr val="tx1"/>
+                </a:solidFill>
+                <a:latin typeface="Arial" charset="0"/>
+                <a:ea typeface="ＭＳ Ｐゴシック" charset="-128"/>
+              </a:defRPr>
+            </a:lvl4pPr>
+            <a:lvl5pPr eaLnBrk="0" hangingPunct="0">
+              <a:defRPr sz="2400" i="1">
+                <a:solidFill>
+                  <a:schemeClr val="tx1"/>
+                </a:solidFill>
+                <a:latin typeface="Arial" charset="0"/>
+                <a:ea typeface="ＭＳ Ｐゴシック" charset="-128"/>
+              </a:defRPr>
+            </a:lvl5pPr>
+            <a:lvl6pPr marL="457200" eaLnBrk="0" fontAlgn="base" hangingPunct="0">
+              <a:spcBef>
+                <a:spcPct val="0"/>
+              </a:spcBef>
+              <a:spcAft>
+                <a:spcPct val="0"/>
+              </a:spcAft>
+              <a:defRPr sz="2400" i="1">
+                <a:solidFill>
+                  <a:schemeClr val="tx1"/>
+                </a:solidFill>
+                <a:latin typeface="Arial" charset="0"/>
+                <a:ea typeface="ＭＳ Ｐゴシック" charset="-128"/>
+              </a:defRPr>
+            </a:lvl6pPr>
+            <a:lvl7pPr marL="914400" eaLnBrk="0" fontAlgn="base" hangingPunct="0">
+              <a:spcBef>
+                <a:spcPct val="0"/>
+              </a:spcBef>
+              <a:spcAft>
+                <a:spcPct val="0"/>
+              </a:spcAft>
+              <a:defRPr sz="2400" i="1">
+                <a:solidFill>
+                  <a:schemeClr val="tx1"/>
+                </a:solidFill>
+                <a:latin typeface="Arial" charset="0"/>
+                <a:ea typeface="ＭＳ Ｐゴシック" charset="-128"/>
+              </a:defRPr>
+            </a:lvl7pPr>
+            <a:lvl8pPr marL="1371600" eaLnBrk="0" fontAlgn="base" hangingPunct="0">
+              <a:spcBef>
+                <a:spcPct val="0"/>
+              </a:spcBef>
+              <a:spcAft>
+                <a:spcPct val="0"/>
+              </a:spcAft>
+              <a:defRPr sz="2400" i="1">
+                <a:solidFill>
+                  <a:schemeClr val="tx1"/>
+                </a:solidFill>
+                <a:latin typeface="Arial" charset="0"/>
+                <a:ea typeface="ＭＳ Ｐゴシック" charset="-128"/>
+              </a:defRPr>
+            </a:lvl8pPr>
+            <a:lvl9pPr marL="1828800" eaLnBrk="0" fontAlgn="base" hangingPunct="0">
+              <a:spcBef>
+                <a:spcPct val="0"/>
+              </a:spcBef>
+              <a:spcAft>
+                <a:spcPct val="0"/>
+              </a:spcAft>
+              <a:defRPr sz="2400" i="1">
+                <a:solidFill>
+                  <a:schemeClr val="tx1"/>
+                </a:solidFill>
+                <a:latin typeface="Arial" charset="0"/>
+                <a:ea typeface="ＭＳ Ｐゴシック" charset="-128"/>
+              </a:defRPr>
+            </a:lvl9pPr>
+          </a:lstStyle>
+          <a:p>
+            <a:pPr eaLnBrk="1" hangingPunct="1"/>
+            <a:r>
+              <a:rPr lang="en-US" altLang="x-none" sz="1800" b="1"/>
+              <a:t>BR4</a:t>
+            </a:r>
+          </a:p>
+        </p:txBody>
+      </p:sp>
+      <p:sp>
+        <p:nvSpPr>
+          <p:cNvPr id="9" name="Text Box 9"/>
+          <p:cNvSpPr txBox="1">
+            <a:spLocks noChangeArrowheads="1"/>
+          </p:cNvSpPr>
+          <p:nvPr/>
+        </p:nvSpPr>
+        <p:spPr bwMode="auto">
+          <a:xfrm rot="-2700000">
+            <a:off x="8839200" y="5849938"/>
+            <a:ext cx="742950" cy="366712"/>
+          </a:xfrm>
+          <a:prstGeom prst="rect">
+            <a:avLst/>
+          </a:prstGeom>
+          <a:noFill/>
+          <a:ln>
+            <a:noFill/>
+          </a:ln>
+          <a:extLst>
+            <a:ext uri="{909E8E84-426E-40DD-AFC4-6F175D3DCCD1}">
+              <a14:hiddenFill xmlns:a14="http://schemas.microsoft.com/office/drawing/2010/main">
+                <a:solidFill>
+                  <a:srgbClr val="FFFFFF"/>
+                </a:solidFill>
+              </a14:hiddenFill>
+            </a:ext>
+            <a:ext uri="{91240B29-F687-4F45-9708-019B960494DF}">
+              <a14:hiddenLine xmlns:a14="http://schemas.microsoft.com/office/drawing/2010/main" w="9525">
+                <a:solidFill>
+                  <a:srgbClr val="000000"/>
+                </a:solidFill>
+                <a:miter lim="800000"/>
+                <a:headEnd/>
+                <a:tailEnd/>
+              </a14:hiddenLine>
+            </a:ext>
+          </a:extLst>
+        </p:spPr>
+        <p:txBody>
+          <a:bodyPr wrap="none">
+            <a:spAutoFit/>
+          </a:bodyPr>
+          <a:lstStyle>
+            <a:lvl1pPr eaLnBrk="0" hangingPunct="0">
+              <a:defRPr sz="2400" i="1">
+                <a:solidFill>
+                  <a:schemeClr val="tx1"/>
+                </a:solidFill>
+                <a:latin typeface="Arial" charset="0"/>
+                <a:ea typeface="ＭＳ Ｐゴシック" charset="-128"/>
+              </a:defRPr>
+            </a:lvl1pPr>
+            <a:lvl2pPr marL="37931725" indent="-37474525" eaLnBrk="0" hangingPunct="0">
+              <a:defRPr sz="2400" i="1">
+                <a:solidFill>
+                  <a:schemeClr val="tx1"/>
+                </a:solidFill>
+                <a:latin typeface="Arial" charset="0"/>
+                <a:ea typeface="ＭＳ Ｐゴシック" charset="-128"/>
+              </a:defRPr>
+            </a:lvl2pPr>
+            <a:lvl3pPr eaLnBrk="0" hangingPunct="0">
+              <a:defRPr sz="2400" i="1">
+                <a:solidFill>
+                  <a:schemeClr val="tx1"/>
+                </a:solidFill>
+                <a:latin typeface="Arial" charset="0"/>
+                <a:ea typeface="ＭＳ Ｐゴシック" charset="-128"/>
+              </a:defRPr>
+            </a:lvl3pPr>
+            <a:lvl4pPr eaLnBrk="0" hangingPunct="0">
+              <a:defRPr sz="2400" i="1">
+                <a:solidFill>
+                  <a:schemeClr val="tx1"/>
+                </a:solidFill>
+                <a:latin typeface="Arial" charset="0"/>
+                <a:ea typeface="ＭＳ Ｐゴシック" charset="-128"/>
+              </a:defRPr>
+            </a:lvl4pPr>
+            <a:lvl5pPr eaLnBrk="0" hangingPunct="0">
+              <a:defRPr sz="2400" i="1">
+                <a:solidFill>
+                  <a:schemeClr val="tx1"/>
+                </a:solidFill>
+                <a:latin typeface="Arial" charset="0"/>
+                <a:ea typeface="ＭＳ Ｐゴシック" charset="-128"/>
+              </a:defRPr>
+            </a:lvl5pPr>
+            <a:lvl6pPr marL="457200" eaLnBrk="0" fontAlgn="base" hangingPunct="0">
+              <a:spcBef>
+                <a:spcPct val="0"/>
+              </a:spcBef>
+              <a:spcAft>
+                <a:spcPct val="0"/>
+              </a:spcAft>
+              <a:defRPr sz="2400" i="1">
+                <a:solidFill>
+                  <a:schemeClr val="tx1"/>
+                </a:solidFill>
+                <a:latin typeface="Arial" charset="0"/>
+                <a:ea typeface="ＭＳ Ｐゴシック" charset="-128"/>
+              </a:defRPr>
+            </a:lvl6pPr>
+            <a:lvl7pPr marL="914400" eaLnBrk="0" fontAlgn="base" hangingPunct="0">
+              <a:spcBef>
+                <a:spcPct val="0"/>
+              </a:spcBef>
+              <a:spcAft>
+                <a:spcPct val="0"/>
+              </a:spcAft>
+              <a:defRPr sz="2400" i="1">
+                <a:solidFill>
+                  <a:schemeClr val="tx1"/>
+                </a:solidFill>
+                <a:latin typeface="Arial" charset="0"/>
+                <a:ea typeface="ＭＳ Ｐゴシック" charset="-128"/>
+              </a:defRPr>
+            </a:lvl7pPr>
+            <a:lvl8pPr marL="1371600" eaLnBrk="0" fontAlgn="base" hangingPunct="0">
+              <a:spcBef>
+                <a:spcPct val="0"/>
+              </a:spcBef>
+              <a:spcAft>
+                <a:spcPct val="0"/>
+              </a:spcAft>
+              <a:defRPr sz="2400" i="1">
+                <a:solidFill>
+                  <a:schemeClr val="tx1"/>
+                </a:solidFill>
+                <a:latin typeface="Arial" charset="0"/>
+                <a:ea typeface="ＭＳ Ｐゴシック" charset="-128"/>
+              </a:defRPr>
+            </a:lvl8pPr>
+            <a:lvl9pPr marL="1828800" eaLnBrk="0" fontAlgn="base" hangingPunct="0">
+              <a:spcBef>
+                <a:spcPct val="0"/>
+              </a:spcBef>
+              <a:spcAft>
+                <a:spcPct val="0"/>
+              </a:spcAft>
+              <a:defRPr sz="2400" i="1">
+                <a:solidFill>
+                  <a:schemeClr val="tx1"/>
+                </a:solidFill>
+                <a:latin typeface="Arial" charset="0"/>
+                <a:ea typeface="ＭＳ Ｐゴシック" charset="-128"/>
+              </a:defRPr>
+            </a:lvl9pPr>
+          </a:lstStyle>
+          <a:p>
+            <a:pPr eaLnBrk="1" hangingPunct="1"/>
+            <a:r>
+              <a:rPr lang="en-US" altLang="x-none" sz="1800" b="1"/>
+              <a:t>Patio</a:t>
+            </a:r>
+          </a:p>
+        </p:txBody>
+      </p:sp>
+      <p:sp>
+        <p:nvSpPr>
+          <p:cNvPr id="10" name="Text Box 10"/>
+          <p:cNvSpPr txBox="1">
+            <a:spLocks noChangeArrowheads="1"/>
+          </p:cNvSpPr>
+          <p:nvPr/>
+        </p:nvSpPr>
+        <p:spPr bwMode="auto">
+          <a:xfrm rot="-2700000">
+            <a:off x="9088438" y="5940426"/>
+            <a:ext cx="971550" cy="366713"/>
+          </a:xfrm>
+          <a:prstGeom prst="rect">
+            <a:avLst/>
+          </a:prstGeom>
+          <a:noFill/>
+          <a:ln>
+            <a:noFill/>
+          </a:ln>
+          <a:extLst>
+            <a:ext uri="{909E8E84-426E-40DD-AFC4-6F175D3DCCD1}">
+              <a14:hiddenFill xmlns:a14="http://schemas.microsoft.com/office/drawing/2010/main">
+                <a:solidFill>
+                  <a:srgbClr val="FFFFFF"/>
+                </a:solidFill>
+              </a14:hiddenFill>
+            </a:ext>
+            <a:ext uri="{91240B29-F687-4F45-9708-019B960494DF}">
+              <a14:hiddenLine xmlns:a14="http://schemas.microsoft.com/office/drawing/2010/main" w="9525">
+                <a:solidFill>
+                  <a:srgbClr val="000000"/>
+                </a:solidFill>
+                <a:miter lim="800000"/>
+                <a:headEnd/>
+                <a:tailEnd/>
+              </a14:hiddenLine>
+            </a:ext>
+          </a:extLst>
+        </p:spPr>
+        <p:txBody>
+          <a:bodyPr wrap="none">
+            <a:spAutoFit/>
+          </a:bodyPr>
+          <a:lstStyle>
+            <a:lvl1pPr eaLnBrk="0" hangingPunct="0">
+              <a:defRPr sz="2400" i="1">
+                <a:solidFill>
+                  <a:schemeClr val="tx1"/>
+                </a:solidFill>
+                <a:latin typeface="Arial" charset="0"/>
+                <a:ea typeface="ＭＳ Ｐゴシック" charset="-128"/>
+              </a:defRPr>
+            </a:lvl1pPr>
+            <a:lvl2pPr marL="37931725" indent="-37474525" eaLnBrk="0" hangingPunct="0">
+              <a:defRPr sz="2400" i="1">
+                <a:solidFill>
+                  <a:schemeClr val="tx1"/>
+                </a:solidFill>
+                <a:latin typeface="Arial" charset="0"/>
+                <a:ea typeface="ＭＳ Ｐゴシック" charset="-128"/>
+              </a:defRPr>
+            </a:lvl2pPr>
+            <a:lvl3pPr eaLnBrk="0" hangingPunct="0">
+              <a:defRPr sz="2400" i="1">
+                <a:solidFill>
+                  <a:schemeClr val="tx1"/>
+                </a:solidFill>
+                <a:latin typeface="Arial" charset="0"/>
+                <a:ea typeface="ＭＳ Ｐゴシック" charset="-128"/>
+              </a:defRPr>
+            </a:lvl3pPr>
+            <a:lvl4pPr eaLnBrk="0" hangingPunct="0">
+              <a:defRPr sz="2400" i="1">
+                <a:solidFill>
+                  <a:schemeClr val="tx1"/>
+                </a:solidFill>
+                <a:latin typeface="Arial" charset="0"/>
+                <a:ea typeface="ＭＳ Ｐゴシック" charset="-128"/>
+              </a:defRPr>
+            </a:lvl4pPr>
+            <a:lvl5pPr eaLnBrk="0" hangingPunct="0">
+              <a:defRPr sz="2400" i="1">
+                <a:solidFill>
+                  <a:schemeClr val="tx1"/>
+                </a:solidFill>
+                <a:latin typeface="Arial" charset="0"/>
+                <a:ea typeface="ＭＳ Ｐゴシック" charset="-128"/>
+              </a:defRPr>
+            </a:lvl5pPr>
+            <a:lvl6pPr marL="457200" eaLnBrk="0" fontAlgn="base" hangingPunct="0">
+              <a:spcBef>
+                <a:spcPct val="0"/>
+              </a:spcBef>
+              <a:spcAft>
+                <a:spcPct val="0"/>
+              </a:spcAft>
+              <a:defRPr sz="2400" i="1">
+                <a:solidFill>
+                  <a:schemeClr val="tx1"/>
+                </a:solidFill>
+                <a:latin typeface="Arial" charset="0"/>
+                <a:ea typeface="ＭＳ Ｐゴシック" charset="-128"/>
+              </a:defRPr>
+            </a:lvl6pPr>
+            <a:lvl7pPr marL="914400" eaLnBrk="0" fontAlgn="base" hangingPunct="0">
+              <a:spcBef>
+                <a:spcPct val="0"/>
+              </a:spcBef>
+              <a:spcAft>
+                <a:spcPct val="0"/>
+              </a:spcAft>
+              <a:defRPr sz="2400" i="1">
+                <a:solidFill>
+                  <a:schemeClr val="tx1"/>
+                </a:solidFill>
+                <a:latin typeface="Arial" charset="0"/>
+                <a:ea typeface="ＭＳ Ｐゴシック" charset="-128"/>
+              </a:defRPr>
+            </a:lvl7pPr>
+            <a:lvl8pPr marL="1371600" eaLnBrk="0" fontAlgn="base" hangingPunct="0">
+              <a:spcBef>
+                <a:spcPct val="0"/>
+              </a:spcBef>
+              <a:spcAft>
+                <a:spcPct val="0"/>
+              </a:spcAft>
+              <a:defRPr sz="2400" i="1">
+                <a:solidFill>
+                  <a:schemeClr val="tx1"/>
+                </a:solidFill>
+                <a:latin typeface="Arial" charset="0"/>
+                <a:ea typeface="ＭＳ Ｐゴシック" charset="-128"/>
+              </a:defRPr>
+            </a:lvl8pPr>
+            <a:lvl9pPr marL="1828800" eaLnBrk="0" fontAlgn="base" hangingPunct="0">
+              <a:spcBef>
+                <a:spcPct val="0"/>
+              </a:spcBef>
+              <a:spcAft>
+                <a:spcPct val="0"/>
+              </a:spcAft>
+              <a:defRPr sz="2400" i="1">
+                <a:solidFill>
+                  <a:schemeClr val="tx1"/>
+                </a:solidFill>
+                <a:latin typeface="Arial" charset="0"/>
+                <a:ea typeface="ＭＳ Ｐゴシック" charset="-128"/>
+              </a:defRPr>
+            </a:lvl9pPr>
+          </a:lstStyle>
+          <a:p>
+            <a:pPr eaLnBrk="1" hangingPunct="1"/>
+            <a:r>
+              <a:rPr lang="en-US" altLang="x-none" sz="1800" b="1"/>
+              <a:t>Garage</a:t>
+            </a:r>
+          </a:p>
+        </p:txBody>
+      </p:sp>
+      <p:sp>
+        <p:nvSpPr>
+          <p:cNvPr id="11" name="Text Box 11"/>
+          <p:cNvSpPr txBox="1">
+            <a:spLocks noChangeArrowheads="1"/>
+          </p:cNvSpPr>
+          <p:nvPr/>
+        </p:nvSpPr>
+        <p:spPr bwMode="auto">
+          <a:xfrm rot="-2700000">
+            <a:off x="8120063" y="5922963"/>
+            <a:ext cx="1022350" cy="366712"/>
+          </a:xfrm>
+          <a:prstGeom prst="rect">
+            <a:avLst/>
+          </a:prstGeom>
+          <a:noFill/>
+          <a:ln>
+            <a:noFill/>
+          </a:ln>
+          <a:extLst>
+            <a:ext uri="{909E8E84-426E-40DD-AFC4-6F175D3DCCD1}">
+              <a14:hiddenFill xmlns:a14="http://schemas.microsoft.com/office/drawing/2010/main">
+                <a:solidFill>
+                  <a:srgbClr val="FFFFFF"/>
+                </a:solidFill>
+              </a14:hiddenFill>
+            </a:ext>
+            <a:ext uri="{91240B29-F687-4F45-9708-019B960494DF}">
+              <a14:hiddenLine xmlns:a14="http://schemas.microsoft.com/office/drawing/2010/main" w="9525">
+                <a:solidFill>
+                  <a:srgbClr val="000000"/>
+                </a:solidFill>
+                <a:miter lim="800000"/>
+                <a:headEnd/>
+                <a:tailEnd/>
+              </a14:hiddenLine>
+            </a:ext>
+          </a:extLst>
+        </p:spPr>
+        <p:txBody>
+          <a:bodyPr wrap="none">
+            <a:spAutoFit/>
+          </a:bodyPr>
+          <a:lstStyle>
+            <a:lvl1pPr eaLnBrk="0" hangingPunct="0">
+              <a:defRPr sz="2400" i="1">
+                <a:solidFill>
+                  <a:schemeClr val="tx1"/>
+                </a:solidFill>
+                <a:latin typeface="Arial" charset="0"/>
+                <a:ea typeface="ＭＳ Ｐゴシック" charset="-128"/>
+              </a:defRPr>
+            </a:lvl1pPr>
+            <a:lvl2pPr marL="37931725" indent="-37474525" eaLnBrk="0" hangingPunct="0">
+              <a:defRPr sz="2400" i="1">
+                <a:solidFill>
+                  <a:schemeClr val="tx1"/>
+                </a:solidFill>
+                <a:latin typeface="Arial" charset="0"/>
+                <a:ea typeface="ＭＳ Ｐゴシック" charset="-128"/>
+              </a:defRPr>
+            </a:lvl2pPr>
+            <a:lvl3pPr eaLnBrk="0" hangingPunct="0">
+              <a:defRPr sz="2400" i="1">
+                <a:solidFill>
+                  <a:schemeClr val="tx1"/>
+                </a:solidFill>
+                <a:latin typeface="Arial" charset="0"/>
+                <a:ea typeface="ＭＳ Ｐゴシック" charset="-128"/>
+              </a:defRPr>
+            </a:lvl3pPr>
+            <a:lvl4pPr eaLnBrk="0" hangingPunct="0">
+              <a:defRPr sz="2400" i="1">
+                <a:solidFill>
+                  <a:schemeClr val="tx1"/>
+                </a:solidFill>
+                <a:latin typeface="Arial" charset="0"/>
+                <a:ea typeface="ＭＳ Ｐゴシック" charset="-128"/>
+              </a:defRPr>
+            </a:lvl4pPr>
+            <a:lvl5pPr eaLnBrk="0" hangingPunct="0">
+              <a:defRPr sz="2400" i="1">
+                <a:solidFill>
+                  <a:schemeClr val="tx1"/>
+                </a:solidFill>
+                <a:latin typeface="Arial" charset="0"/>
+                <a:ea typeface="ＭＳ Ｐゴシック" charset="-128"/>
+              </a:defRPr>
+            </a:lvl5pPr>
+            <a:lvl6pPr marL="457200" eaLnBrk="0" fontAlgn="base" hangingPunct="0">
+              <a:spcBef>
+                <a:spcPct val="0"/>
+              </a:spcBef>
+              <a:spcAft>
+                <a:spcPct val="0"/>
+              </a:spcAft>
+              <a:defRPr sz="2400" i="1">
+                <a:solidFill>
+                  <a:schemeClr val="tx1"/>
+                </a:solidFill>
+                <a:latin typeface="Arial" charset="0"/>
+                <a:ea typeface="ＭＳ Ｐゴシック" charset="-128"/>
+              </a:defRPr>
+            </a:lvl6pPr>
+            <a:lvl7pPr marL="914400" eaLnBrk="0" fontAlgn="base" hangingPunct="0">
+              <a:spcBef>
+                <a:spcPct val="0"/>
+              </a:spcBef>
+              <a:spcAft>
+                <a:spcPct val="0"/>
+              </a:spcAft>
+              <a:defRPr sz="2400" i="1">
+                <a:solidFill>
+                  <a:schemeClr val="tx1"/>
+                </a:solidFill>
+                <a:latin typeface="Arial" charset="0"/>
+                <a:ea typeface="ＭＳ Ｐゴシック" charset="-128"/>
+              </a:defRPr>
+            </a:lvl7pPr>
+            <a:lvl8pPr marL="1371600" eaLnBrk="0" fontAlgn="base" hangingPunct="0">
+              <a:spcBef>
+                <a:spcPct val="0"/>
+              </a:spcBef>
+              <a:spcAft>
+                <a:spcPct val="0"/>
+              </a:spcAft>
+              <a:defRPr sz="2400" i="1">
+                <a:solidFill>
+                  <a:schemeClr val="tx1"/>
+                </a:solidFill>
+                <a:latin typeface="Arial" charset="0"/>
+                <a:ea typeface="ＭＳ Ｐゴシック" charset="-128"/>
+              </a:defRPr>
+            </a:lvl8pPr>
+            <a:lvl9pPr marL="1828800" eaLnBrk="0" fontAlgn="base" hangingPunct="0">
+              <a:spcBef>
+                <a:spcPct val="0"/>
+              </a:spcBef>
+              <a:spcAft>
+                <a:spcPct val="0"/>
+              </a:spcAft>
+              <a:defRPr sz="2400" i="1">
+                <a:solidFill>
+                  <a:schemeClr val="tx1"/>
+                </a:solidFill>
+                <a:latin typeface="Arial" charset="0"/>
+                <a:ea typeface="ＭＳ Ｐゴシック" charset="-128"/>
+              </a:defRPr>
+            </a:lvl9pPr>
+          </a:lstStyle>
+          <a:p>
+            <a:pPr eaLnBrk="1" hangingPunct="1"/>
+            <a:r>
+              <a:rPr lang="en-US" altLang="x-none" sz="1800" b="1"/>
+              <a:t>Kitchen</a:t>
+            </a:r>
+          </a:p>
+        </p:txBody>
+      </p:sp>
+      <p:sp>
+        <p:nvSpPr>
+          <p:cNvPr id="12" name="Text Box 12"/>
+          <p:cNvSpPr txBox="1">
+            <a:spLocks noChangeArrowheads="1"/>
+          </p:cNvSpPr>
+          <p:nvPr/>
+        </p:nvSpPr>
+        <p:spPr bwMode="auto">
+          <a:xfrm rot="-2700000">
+            <a:off x="7723188" y="5864226"/>
+            <a:ext cx="857250" cy="366713"/>
+          </a:xfrm>
+          <a:prstGeom prst="rect">
+            <a:avLst/>
+          </a:prstGeom>
+          <a:noFill/>
+          <a:ln>
+            <a:noFill/>
+          </a:ln>
+          <a:extLst>
+            <a:ext uri="{909E8E84-426E-40DD-AFC4-6F175D3DCCD1}">
+              <a14:hiddenFill xmlns:a14="http://schemas.microsoft.com/office/drawing/2010/main">
+                <a:solidFill>
+                  <a:srgbClr val="FFFFFF"/>
+                </a:solidFill>
+              </a14:hiddenFill>
+            </a:ext>
+            <a:ext uri="{91240B29-F687-4F45-9708-019B960494DF}">
+              <a14:hiddenLine xmlns:a14="http://schemas.microsoft.com/office/drawing/2010/main" w="9525">
+                <a:solidFill>
+                  <a:srgbClr val="000000"/>
+                </a:solidFill>
+                <a:miter lim="800000"/>
+                <a:headEnd/>
+                <a:tailEnd/>
+              </a14:hiddenLine>
+            </a:ext>
+          </a:extLst>
+        </p:spPr>
+        <p:txBody>
+          <a:bodyPr wrap="none">
+            <a:spAutoFit/>
+          </a:bodyPr>
+          <a:lstStyle>
+            <a:lvl1pPr eaLnBrk="0" hangingPunct="0">
+              <a:defRPr sz="2400" i="1">
+                <a:solidFill>
+                  <a:schemeClr val="tx1"/>
+                </a:solidFill>
+                <a:latin typeface="Arial" charset="0"/>
+                <a:ea typeface="ＭＳ Ｐゴシック" charset="-128"/>
+              </a:defRPr>
+            </a:lvl1pPr>
+            <a:lvl2pPr marL="37931725" indent="-37474525" eaLnBrk="0" hangingPunct="0">
+              <a:defRPr sz="2400" i="1">
+                <a:solidFill>
+                  <a:schemeClr val="tx1"/>
+                </a:solidFill>
+                <a:latin typeface="Arial" charset="0"/>
+                <a:ea typeface="ＭＳ Ｐゴシック" charset="-128"/>
+              </a:defRPr>
+            </a:lvl2pPr>
+            <a:lvl3pPr eaLnBrk="0" hangingPunct="0">
+              <a:defRPr sz="2400" i="1">
+                <a:solidFill>
+                  <a:schemeClr val="tx1"/>
+                </a:solidFill>
+                <a:latin typeface="Arial" charset="0"/>
+                <a:ea typeface="ＭＳ Ｐゴシック" charset="-128"/>
+              </a:defRPr>
+            </a:lvl3pPr>
+            <a:lvl4pPr eaLnBrk="0" hangingPunct="0">
+              <a:defRPr sz="2400" i="1">
+                <a:solidFill>
+                  <a:schemeClr val="tx1"/>
+                </a:solidFill>
+                <a:latin typeface="Arial" charset="0"/>
+                <a:ea typeface="ＭＳ Ｐゴシック" charset="-128"/>
+              </a:defRPr>
+            </a:lvl4pPr>
+            <a:lvl5pPr eaLnBrk="0" hangingPunct="0">
+              <a:defRPr sz="2400" i="1">
+                <a:solidFill>
+                  <a:schemeClr val="tx1"/>
+                </a:solidFill>
+                <a:latin typeface="Arial" charset="0"/>
+                <a:ea typeface="ＭＳ Ｐゴシック" charset="-128"/>
+              </a:defRPr>
+            </a:lvl5pPr>
+            <a:lvl6pPr marL="457200" eaLnBrk="0" fontAlgn="base" hangingPunct="0">
+              <a:spcBef>
+                <a:spcPct val="0"/>
+              </a:spcBef>
+              <a:spcAft>
+                <a:spcPct val="0"/>
+              </a:spcAft>
+              <a:defRPr sz="2400" i="1">
+                <a:solidFill>
+                  <a:schemeClr val="tx1"/>
+                </a:solidFill>
+                <a:latin typeface="Arial" charset="0"/>
+                <a:ea typeface="ＭＳ Ｐゴシック" charset="-128"/>
+              </a:defRPr>
+            </a:lvl6pPr>
+            <a:lvl7pPr marL="914400" eaLnBrk="0" fontAlgn="base" hangingPunct="0">
+              <a:spcBef>
+                <a:spcPct val="0"/>
+              </a:spcBef>
+              <a:spcAft>
+                <a:spcPct val="0"/>
+              </a:spcAft>
+              <a:defRPr sz="2400" i="1">
+                <a:solidFill>
+                  <a:schemeClr val="tx1"/>
+                </a:solidFill>
+                <a:latin typeface="Arial" charset="0"/>
+                <a:ea typeface="ＭＳ Ｐゴシック" charset="-128"/>
+              </a:defRPr>
+            </a:lvl7pPr>
+            <a:lvl8pPr marL="1371600" eaLnBrk="0" fontAlgn="base" hangingPunct="0">
+              <a:spcBef>
+                <a:spcPct val="0"/>
+              </a:spcBef>
+              <a:spcAft>
+                <a:spcPct val="0"/>
+              </a:spcAft>
+              <a:defRPr sz="2400" i="1">
+                <a:solidFill>
+                  <a:schemeClr val="tx1"/>
+                </a:solidFill>
+                <a:latin typeface="Arial" charset="0"/>
+                <a:ea typeface="ＭＳ Ｐゴシック" charset="-128"/>
+              </a:defRPr>
+            </a:lvl8pPr>
+            <a:lvl9pPr marL="1828800" eaLnBrk="0" fontAlgn="base" hangingPunct="0">
+              <a:spcBef>
+                <a:spcPct val="0"/>
+              </a:spcBef>
+              <a:spcAft>
+                <a:spcPct val="0"/>
+              </a:spcAft>
+              <a:defRPr sz="2400" i="1">
+                <a:solidFill>
+                  <a:schemeClr val="tx1"/>
+                </a:solidFill>
+                <a:latin typeface="Arial" charset="0"/>
+                <a:ea typeface="ＭＳ Ｐゴシック" charset="-128"/>
+              </a:defRPr>
+            </a:lvl9pPr>
+          </a:lstStyle>
+          <a:p>
+            <a:pPr eaLnBrk="1" hangingPunct="1"/>
+            <a:r>
+              <a:rPr lang="en-US" altLang="x-none" sz="1800" b="1"/>
+              <a:t>Living</a:t>
+            </a:r>
+          </a:p>
+        </p:txBody>
+      </p:sp>
+      <p:sp>
+        <p:nvSpPr>
+          <p:cNvPr id="13" name="Text Box 13"/>
+          <p:cNvSpPr txBox="1">
+            <a:spLocks noChangeArrowheads="1"/>
+          </p:cNvSpPr>
+          <p:nvPr/>
+        </p:nvSpPr>
+        <p:spPr bwMode="auto">
+          <a:xfrm rot="-2700000">
+            <a:off x="9386888" y="6034088"/>
+            <a:ext cx="1390650" cy="366712"/>
+          </a:xfrm>
+          <a:prstGeom prst="rect">
+            <a:avLst/>
+          </a:prstGeom>
+          <a:noFill/>
+          <a:ln>
+            <a:noFill/>
+          </a:ln>
+          <a:extLst>
+            <a:ext uri="{909E8E84-426E-40DD-AFC4-6F175D3DCCD1}">
+              <a14:hiddenFill xmlns:a14="http://schemas.microsoft.com/office/drawing/2010/main">
+                <a:solidFill>
+                  <a:srgbClr val="FFFFFF"/>
+                </a:solidFill>
+              </a14:hiddenFill>
+            </a:ext>
+            <a:ext uri="{91240B29-F687-4F45-9708-019B960494DF}">
+              <a14:hiddenLine xmlns:a14="http://schemas.microsoft.com/office/drawing/2010/main" w="9525">
+                <a:solidFill>
+                  <a:srgbClr val="000000"/>
+                </a:solidFill>
+                <a:miter lim="800000"/>
+                <a:headEnd/>
+                <a:tailEnd/>
+              </a14:hiddenLine>
+            </a:ext>
+          </a:extLst>
+        </p:spPr>
+        <p:txBody>
+          <a:bodyPr wrap="none">
+            <a:spAutoFit/>
+          </a:bodyPr>
+          <a:lstStyle>
+            <a:lvl1pPr eaLnBrk="0" hangingPunct="0">
+              <a:defRPr sz="2400" i="1">
+                <a:solidFill>
+                  <a:schemeClr val="tx1"/>
+                </a:solidFill>
+                <a:latin typeface="Arial" charset="0"/>
+                <a:ea typeface="ＭＳ Ｐゴシック" charset="-128"/>
+              </a:defRPr>
+            </a:lvl1pPr>
+            <a:lvl2pPr marL="37931725" indent="-37474525" eaLnBrk="0" hangingPunct="0">
+              <a:defRPr sz="2400" i="1">
+                <a:solidFill>
+                  <a:schemeClr val="tx1"/>
+                </a:solidFill>
+                <a:latin typeface="Arial" charset="0"/>
+                <a:ea typeface="ＭＳ Ｐゴシック" charset="-128"/>
+              </a:defRPr>
+            </a:lvl2pPr>
+            <a:lvl3pPr eaLnBrk="0" hangingPunct="0">
+              <a:defRPr sz="2400" i="1">
+                <a:solidFill>
+                  <a:schemeClr val="tx1"/>
+                </a:solidFill>
+                <a:latin typeface="Arial" charset="0"/>
+                <a:ea typeface="ＭＳ Ｐゴシック" charset="-128"/>
+              </a:defRPr>
+            </a:lvl3pPr>
+            <a:lvl4pPr eaLnBrk="0" hangingPunct="0">
+              <a:defRPr sz="2400" i="1">
+                <a:solidFill>
+                  <a:schemeClr val="tx1"/>
+                </a:solidFill>
+                <a:latin typeface="Arial" charset="0"/>
+                <a:ea typeface="ＭＳ Ｐゴシック" charset="-128"/>
+              </a:defRPr>
+            </a:lvl4pPr>
+            <a:lvl5pPr eaLnBrk="0" hangingPunct="0">
+              <a:defRPr sz="2400" i="1">
+                <a:solidFill>
+                  <a:schemeClr val="tx1"/>
+                </a:solidFill>
+                <a:latin typeface="Arial" charset="0"/>
+                <a:ea typeface="ＭＳ Ｐゴシック" charset="-128"/>
+              </a:defRPr>
+            </a:lvl5pPr>
+            <a:lvl6pPr marL="457200" eaLnBrk="0" fontAlgn="base" hangingPunct="0">
+              <a:spcBef>
+                <a:spcPct val="0"/>
+              </a:spcBef>
+              <a:spcAft>
+                <a:spcPct val="0"/>
+              </a:spcAft>
+              <a:defRPr sz="2400" i="1">
+                <a:solidFill>
+                  <a:schemeClr val="tx1"/>
+                </a:solidFill>
+                <a:latin typeface="Arial" charset="0"/>
+                <a:ea typeface="ＭＳ Ｐゴシック" charset="-128"/>
+              </a:defRPr>
+            </a:lvl6pPr>
+            <a:lvl7pPr marL="914400" eaLnBrk="0" fontAlgn="base" hangingPunct="0">
+              <a:spcBef>
+                <a:spcPct val="0"/>
+              </a:spcBef>
+              <a:spcAft>
+                <a:spcPct val="0"/>
+              </a:spcAft>
+              <a:defRPr sz="2400" i="1">
+                <a:solidFill>
+                  <a:schemeClr val="tx1"/>
+                </a:solidFill>
+                <a:latin typeface="Arial" charset="0"/>
+                <a:ea typeface="ＭＳ Ｐゴシック" charset="-128"/>
+              </a:defRPr>
+            </a:lvl7pPr>
+            <a:lvl8pPr marL="1371600" eaLnBrk="0" fontAlgn="base" hangingPunct="0">
+              <a:spcBef>
+                <a:spcPct val="0"/>
+              </a:spcBef>
+              <a:spcAft>
+                <a:spcPct val="0"/>
+              </a:spcAft>
+              <a:defRPr sz="2400" i="1">
+                <a:solidFill>
+                  <a:schemeClr val="tx1"/>
+                </a:solidFill>
+                <a:latin typeface="Arial" charset="0"/>
+                <a:ea typeface="ＭＳ Ｐゴシック" charset="-128"/>
+              </a:defRPr>
+            </a:lvl8pPr>
+            <a:lvl9pPr marL="1828800" eaLnBrk="0" fontAlgn="base" hangingPunct="0">
+              <a:spcBef>
+                <a:spcPct val="0"/>
+              </a:spcBef>
+              <a:spcAft>
+                <a:spcPct val="0"/>
+              </a:spcAft>
+              <a:defRPr sz="2400" i="1">
+                <a:solidFill>
+                  <a:schemeClr val="tx1"/>
+                </a:solidFill>
+                <a:latin typeface="Arial" charset="0"/>
+                <a:ea typeface="ＭＳ Ｐゴシック" charset="-128"/>
+              </a:defRPr>
+            </a:lvl9pPr>
+          </a:lstStyle>
+          <a:p>
+            <a:pPr eaLnBrk="1" hangingPunct="1"/>
+            <a:r>
+              <a:rPr lang="en-US" altLang="x-none" sz="1800" b="1"/>
+              <a:t>Bathrooms</a:t>
+            </a:r>
+          </a:p>
+        </p:txBody>
+      </p:sp>
+      <p:sp>
+        <p:nvSpPr>
+          <p:cNvPr id="14" name="Line 14"/>
+          <p:cNvSpPr>
+            <a:spLocks noChangeShapeType="1"/>
+          </p:cNvSpPr>
+          <p:nvPr/>
+        </p:nvSpPr>
+        <p:spPr bwMode="auto">
+          <a:xfrm>
+            <a:off x="6272213" y="5556250"/>
+            <a:ext cx="0" cy="228600"/>
+          </a:xfrm>
+          <a:prstGeom prst="line">
+            <a:avLst/>
+          </a:prstGeom>
+          <a:noFill/>
+          <a:ln w="25400">
+            <a:solidFill>
+              <a:schemeClr val="tx1"/>
+            </a:solidFill>
+            <a:round/>
+            <a:headEnd/>
+            <a:tailEnd/>
+          </a:ln>
+          <a:extLst>
+            <a:ext uri="{909E8E84-426E-40DD-AFC4-6F175D3DCCD1}">
+              <a14:hiddenFill xmlns:a14="http://schemas.microsoft.com/office/drawing/2010/main">
+                <a:noFill/>
+              </a14:hiddenFill>
+            </a:ext>
+          </a:extLst>
+        </p:spPr>
+        <p:txBody>
+          <a:bodyPr/>
+          <a:lstStyle/>
+          <a:p>
+            <a:endParaRPr lang="en-US"/>
+          </a:p>
+        </p:txBody>
+      </p:sp>
+      <p:sp>
+        <p:nvSpPr>
+          <p:cNvPr id="15" name="Line 15"/>
+          <p:cNvSpPr>
+            <a:spLocks noChangeShapeType="1"/>
+          </p:cNvSpPr>
+          <p:nvPr/>
+        </p:nvSpPr>
+        <p:spPr bwMode="auto">
+          <a:xfrm>
+            <a:off x="6767513" y="5556250"/>
+            <a:ext cx="0" cy="228600"/>
+          </a:xfrm>
+          <a:prstGeom prst="line">
+            <a:avLst/>
+          </a:prstGeom>
+          <a:noFill/>
+          <a:ln w="25400">
+            <a:solidFill>
+              <a:schemeClr val="tx1"/>
+            </a:solidFill>
+            <a:round/>
+            <a:headEnd/>
+            <a:tailEnd/>
+          </a:ln>
+          <a:extLst>
+            <a:ext uri="{909E8E84-426E-40DD-AFC4-6F175D3DCCD1}">
+              <a14:hiddenFill xmlns:a14="http://schemas.microsoft.com/office/drawing/2010/main">
+                <a:noFill/>
+              </a14:hiddenFill>
+            </a:ext>
+          </a:extLst>
+        </p:spPr>
+        <p:txBody>
+          <a:bodyPr/>
+          <a:lstStyle/>
+          <a:p>
+            <a:endParaRPr lang="en-US"/>
+          </a:p>
+        </p:txBody>
+      </p:sp>
+      <p:sp>
+        <p:nvSpPr>
+          <p:cNvPr id="16" name="Line 16"/>
+          <p:cNvSpPr>
+            <a:spLocks noChangeShapeType="1"/>
+          </p:cNvSpPr>
+          <p:nvPr/>
+        </p:nvSpPr>
+        <p:spPr bwMode="auto">
+          <a:xfrm>
+            <a:off x="7262813" y="5556250"/>
+            <a:ext cx="0" cy="228600"/>
+          </a:xfrm>
+          <a:prstGeom prst="line">
+            <a:avLst/>
+          </a:prstGeom>
+          <a:noFill/>
+          <a:ln w="25400">
+            <a:solidFill>
+              <a:schemeClr val="tx1"/>
+            </a:solidFill>
+            <a:round/>
+            <a:headEnd/>
+            <a:tailEnd/>
+          </a:ln>
+          <a:extLst>
+            <a:ext uri="{909E8E84-426E-40DD-AFC4-6F175D3DCCD1}">
+              <a14:hiddenFill xmlns:a14="http://schemas.microsoft.com/office/drawing/2010/main">
+                <a:noFill/>
+              </a14:hiddenFill>
+            </a:ext>
+          </a:extLst>
+        </p:spPr>
+        <p:txBody>
+          <a:bodyPr/>
+          <a:lstStyle/>
+          <a:p>
+            <a:endParaRPr lang="en-US"/>
+          </a:p>
+        </p:txBody>
+      </p:sp>
+      <p:sp>
+        <p:nvSpPr>
+          <p:cNvPr id="17" name="Line 17"/>
+          <p:cNvSpPr>
+            <a:spLocks noChangeShapeType="1"/>
+          </p:cNvSpPr>
+          <p:nvPr/>
+        </p:nvSpPr>
+        <p:spPr bwMode="auto">
+          <a:xfrm>
+            <a:off x="7758113" y="5556250"/>
+            <a:ext cx="0" cy="228600"/>
+          </a:xfrm>
+          <a:prstGeom prst="line">
+            <a:avLst/>
+          </a:prstGeom>
+          <a:noFill/>
+          <a:ln w="25400">
+            <a:solidFill>
+              <a:schemeClr val="tx1"/>
+            </a:solidFill>
+            <a:round/>
+            <a:headEnd/>
+            <a:tailEnd/>
+          </a:ln>
+          <a:extLst>
+            <a:ext uri="{909E8E84-426E-40DD-AFC4-6F175D3DCCD1}">
+              <a14:hiddenFill xmlns:a14="http://schemas.microsoft.com/office/drawing/2010/main">
+                <a:noFill/>
+              </a14:hiddenFill>
+            </a:ext>
+          </a:extLst>
+        </p:spPr>
+        <p:txBody>
+          <a:bodyPr/>
+          <a:lstStyle/>
+          <a:p>
+            <a:endParaRPr lang="en-US"/>
+          </a:p>
+        </p:txBody>
+      </p:sp>
+      <p:sp>
+        <p:nvSpPr>
+          <p:cNvPr id="18" name="Line 18"/>
+          <p:cNvSpPr>
+            <a:spLocks noChangeShapeType="1"/>
+          </p:cNvSpPr>
+          <p:nvPr/>
+        </p:nvSpPr>
+        <p:spPr bwMode="auto">
+          <a:xfrm>
+            <a:off x="8253413" y="5556250"/>
+            <a:ext cx="0" cy="228600"/>
+          </a:xfrm>
+          <a:prstGeom prst="line">
+            <a:avLst/>
+          </a:prstGeom>
+          <a:noFill/>
+          <a:ln w="25400">
+            <a:solidFill>
+              <a:schemeClr val="tx1"/>
+            </a:solidFill>
+            <a:round/>
+            <a:headEnd/>
+            <a:tailEnd/>
+          </a:ln>
+          <a:extLst>
+            <a:ext uri="{909E8E84-426E-40DD-AFC4-6F175D3DCCD1}">
+              <a14:hiddenFill xmlns:a14="http://schemas.microsoft.com/office/drawing/2010/main">
+                <a:noFill/>
+              </a14:hiddenFill>
+            </a:ext>
+          </a:extLst>
+        </p:spPr>
+        <p:txBody>
+          <a:bodyPr/>
+          <a:lstStyle/>
+          <a:p>
+            <a:endParaRPr lang="en-US"/>
+          </a:p>
+        </p:txBody>
+      </p:sp>
+      <p:sp>
+        <p:nvSpPr>
+          <p:cNvPr id="19" name="Line 19"/>
+          <p:cNvSpPr>
+            <a:spLocks noChangeShapeType="1"/>
+          </p:cNvSpPr>
+          <p:nvPr/>
+        </p:nvSpPr>
+        <p:spPr bwMode="auto">
+          <a:xfrm>
+            <a:off x="8748713" y="5556250"/>
+            <a:ext cx="0" cy="228600"/>
+          </a:xfrm>
+          <a:prstGeom prst="line">
+            <a:avLst/>
+          </a:prstGeom>
+          <a:noFill/>
+          <a:ln w="25400">
+            <a:solidFill>
+              <a:schemeClr val="tx1"/>
+            </a:solidFill>
+            <a:round/>
+            <a:headEnd/>
+            <a:tailEnd/>
+          </a:ln>
+          <a:extLst>
+            <a:ext uri="{909E8E84-426E-40DD-AFC4-6F175D3DCCD1}">
+              <a14:hiddenFill xmlns:a14="http://schemas.microsoft.com/office/drawing/2010/main">
+                <a:noFill/>
+              </a14:hiddenFill>
+            </a:ext>
+          </a:extLst>
+        </p:spPr>
+        <p:txBody>
+          <a:bodyPr/>
+          <a:lstStyle/>
+          <a:p>
+            <a:endParaRPr lang="en-US"/>
+          </a:p>
+        </p:txBody>
+      </p:sp>
+      <p:sp>
+        <p:nvSpPr>
+          <p:cNvPr id="20" name="Line 20"/>
+          <p:cNvSpPr>
+            <a:spLocks noChangeShapeType="1"/>
+          </p:cNvSpPr>
+          <p:nvPr/>
+        </p:nvSpPr>
+        <p:spPr bwMode="auto">
+          <a:xfrm>
+            <a:off x="9244013" y="5556250"/>
+            <a:ext cx="0" cy="228600"/>
+          </a:xfrm>
+          <a:prstGeom prst="line">
+            <a:avLst/>
+          </a:prstGeom>
+          <a:noFill/>
+          <a:ln w="25400">
+            <a:solidFill>
+              <a:schemeClr val="tx1"/>
+            </a:solidFill>
+            <a:round/>
+            <a:headEnd/>
+            <a:tailEnd/>
+          </a:ln>
+          <a:extLst>
+            <a:ext uri="{909E8E84-426E-40DD-AFC4-6F175D3DCCD1}">
+              <a14:hiddenFill xmlns:a14="http://schemas.microsoft.com/office/drawing/2010/main">
+                <a:noFill/>
+              </a14:hiddenFill>
+            </a:ext>
+          </a:extLst>
+        </p:spPr>
+        <p:txBody>
+          <a:bodyPr/>
+          <a:lstStyle/>
+          <a:p>
+            <a:endParaRPr lang="en-US"/>
+          </a:p>
+        </p:txBody>
+      </p:sp>
+      <p:sp>
+        <p:nvSpPr>
+          <p:cNvPr id="21" name="Line 21"/>
+          <p:cNvSpPr>
+            <a:spLocks noChangeShapeType="1"/>
+          </p:cNvSpPr>
+          <p:nvPr/>
+        </p:nvSpPr>
+        <p:spPr bwMode="auto">
+          <a:xfrm>
+            <a:off x="9739313" y="5556250"/>
+            <a:ext cx="0" cy="228600"/>
+          </a:xfrm>
+          <a:prstGeom prst="line">
+            <a:avLst/>
+          </a:prstGeom>
+          <a:noFill/>
+          <a:ln w="25400">
+            <a:solidFill>
+              <a:schemeClr val="tx1"/>
+            </a:solidFill>
+            <a:round/>
+            <a:headEnd/>
+            <a:tailEnd/>
+          </a:ln>
+          <a:extLst>
+            <a:ext uri="{909E8E84-426E-40DD-AFC4-6F175D3DCCD1}">
+              <a14:hiddenFill xmlns:a14="http://schemas.microsoft.com/office/drawing/2010/main">
+                <a:noFill/>
+              </a14:hiddenFill>
+            </a:ext>
+          </a:extLst>
+        </p:spPr>
+        <p:txBody>
+          <a:bodyPr/>
+          <a:lstStyle/>
+          <a:p>
+            <a:endParaRPr lang="en-US"/>
+          </a:p>
+        </p:txBody>
+      </p:sp>
+      <p:sp>
+        <p:nvSpPr>
+          <p:cNvPr id="22" name="Line 22"/>
+          <p:cNvSpPr>
+            <a:spLocks noChangeShapeType="1"/>
+          </p:cNvSpPr>
+          <p:nvPr/>
+        </p:nvSpPr>
+        <p:spPr bwMode="auto">
+          <a:xfrm>
+            <a:off x="10234613" y="5556250"/>
+            <a:ext cx="0" cy="228600"/>
+          </a:xfrm>
+          <a:prstGeom prst="line">
+            <a:avLst/>
+          </a:prstGeom>
+          <a:noFill/>
+          <a:ln w="25400">
+            <a:solidFill>
+              <a:schemeClr val="tx1"/>
+            </a:solidFill>
+            <a:round/>
+            <a:headEnd/>
+            <a:tailEnd/>
+          </a:ln>
+          <a:extLst>
+            <a:ext uri="{909E8E84-426E-40DD-AFC4-6F175D3DCCD1}">
+              <a14:hiddenFill xmlns:a14="http://schemas.microsoft.com/office/drawing/2010/main">
+                <a:noFill/>
+              </a14:hiddenFill>
+            </a:ext>
+          </a:extLst>
+        </p:spPr>
+        <p:txBody>
+          <a:bodyPr/>
+          <a:lstStyle/>
+          <a:p>
+            <a:endParaRPr lang="en-US"/>
+          </a:p>
+        </p:txBody>
+      </p:sp>
+      <p:grpSp>
+        <p:nvGrpSpPr>
+          <p:cNvPr id="32" name="Group 32"/>
+          <p:cNvGrpSpPr>
+            <a:grpSpLocks/>
+          </p:cNvGrpSpPr>
+          <p:nvPr/>
+        </p:nvGrpSpPr>
+        <p:grpSpPr bwMode="auto">
+          <a:xfrm>
+            <a:off x="5815013" y="2070101"/>
+            <a:ext cx="4724400" cy="3527425"/>
+            <a:chOff x="2880" y="1296"/>
+            <a:chExt cx="2880" cy="2222"/>
+          </a:xfrm>
+        </p:grpSpPr>
+        <p:sp>
+          <p:nvSpPr>
+            <p:cNvPr id="33" name="Line 33"/>
+            <p:cNvSpPr>
+              <a:spLocks noChangeShapeType="1"/>
+            </p:cNvSpPr>
+            <p:nvPr/>
+          </p:nvSpPr>
+          <p:spPr bwMode="auto">
+            <a:xfrm>
+              <a:off x="2880" y="3504"/>
+              <a:ext cx="2880" cy="0"/>
+            </a:xfrm>
+            <a:prstGeom prst="line">
+              <a:avLst/>
+            </a:prstGeom>
+            <a:noFill/>
+            <a:ln w="38100">
+              <a:solidFill>
+                <a:schemeClr val="tx1"/>
+              </a:solidFill>
+              <a:round/>
+              <a:headEnd/>
+              <a:tailEnd type="stealth" w="lg" len="lg"/>
+            </a:ln>
+            <a:extLst>
+              <a:ext uri="{909E8E84-426E-40DD-AFC4-6F175D3DCCD1}">
+                <a14:hiddenFill xmlns:a14="http://schemas.microsoft.com/office/drawing/2010/main">
+                  <a:noFill/>
+                </a14:hiddenFill>
+              </a:ext>
+            </a:extLst>
+          </p:spPr>
+          <p:txBody>
+            <a:bodyPr/>
+            <a:lstStyle/>
+            <a:p>
+              <a:endParaRPr lang="en-US"/>
+            </a:p>
+          </p:txBody>
+        </p:sp>
+        <p:sp>
+          <p:nvSpPr>
+            <p:cNvPr id="34" name="Line 34"/>
+            <p:cNvSpPr>
+              <a:spLocks noChangeShapeType="1"/>
+            </p:cNvSpPr>
+            <p:nvPr/>
+          </p:nvSpPr>
+          <p:spPr bwMode="auto">
+            <a:xfrm rot="5400000" flipH="1">
+              <a:off x="1776" y="2400"/>
+              <a:ext cx="2222" cy="14"/>
+            </a:xfrm>
+            <a:prstGeom prst="line">
+              <a:avLst/>
+            </a:prstGeom>
+            <a:noFill/>
+            <a:ln w="38100">
+              <a:solidFill>
+                <a:schemeClr val="tx1"/>
+              </a:solidFill>
+              <a:round/>
+              <a:headEnd/>
+              <a:tailEnd type="stealth" w="lg" len="lg"/>
+            </a:ln>
+            <a:extLst>
+              <a:ext uri="{909E8E84-426E-40DD-AFC4-6F175D3DCCD1}">
+                <a14:hiddenFill xmlns:a14="http://schemas.microsoft.com/office/drawing/2010/main">
+                  <a:noFill/>
+                </a14:hiddenFill>
+              </a:ext>
+            </a:extLst>
+          </p:spPr>
+          <p:txBody>
+            <a:bodyPr/>
+            <a:lstStyle/>
+            <a:p>
+              <a:endParaRPr lang="en-US"/>
+            </a:p>
+          </p:txBody>
+        </p:sp>
+      </p:grpSp>
+      <p:sp>
+        <p:nvSpPr>
+          <p:cNvPr id="59" name="Text Box 59"/>
+          <p:cNvSpPr txBox="1">
+            <a:spLocks noChangeArrowheads="1"/>
+          </p:cNvSpPr>
+          <p:nvPr/>
+        </p:nvSpPr>
+        <p:spPr bwMode="auto">
+          <a:xfrm rot="-5400000">
+            <a:off x="4784726" y="3294064"/>
+            <a:ext cx="1495425" cy="396875"/>
+          </a:xfrm>
+          <a:prstGeom prst="rect">
+            <a:avLst/>
+          </a:prstGeom>
+          <a:noFill/>
+          <a:ln>
+            <a:noFill/>
+          </a:ln>
+          <a:extLst>
+            <a:ext uri="{909E8E84-426E-40DD-AFC4-6F175D3DCCD1}">
+              <a14:hiddenFill xmlns:a14="http://schemas.microsoft.com/office/drawing/2010/main">
+                <a:solidFill>
+                  <a:srgbClr val="FFFFFF"/>
+                </a:solidFill>
+              </a14:hiddenFill>
+            </a:ext>
+            <a:ext uri="{91240B29-F687-4F45-9708-019B960494DF}">
+              <a14:hiddenLine xmlns:a14="http://schemas.microsoft.com/office/drawing/2010/main" w="9525">
+                <a:solidFill>
+                  <a:srgbClr val="000000"/>
+                </a:solidFill>
+                <a:miter lim="800000"/>
+                <a:headEnd/>
+                <a:tailEnd/>
+              </a14:hiddenLine>
+            </a:ext>
+          </a:extLst>
+        </p:spPr>
+        <p:txBody>
+          <a:bodyPr wrap="none">
+            <a:spAutoFit/>
+          </a:bodyPr>
+          <a:lstStyle>
+            <a:lvl1pPr eaLnBrk="0" hangingPunct="0">
+              <a:defRPr sz="2400" i="1">
+                <a:solidFill>
+                  <a:schemeClr val="tx1"/>
+                </a:solidFill>
+                <a:latin typeface="Arial" charset="0"/>
+                <a:ea typeface="ＭＳ Ｐゴシック" charset="-128"/>
+              </a:defRPr>
+            </a:lvl1pPr>
+            <a:lvl2pPr marL="37931725" indent="-37474525" eaLnBrk="0" hangingPunct="0">
+              <a:defRPr sz="2400" i="1">
+                <a:solidFill>
+                  <a:schemeClr val="tx1"/>
+                </a:solidFill>
+                <a:latin typeface="Arial" charset="0"/>
+                <a:ea typeface="ＭＳ Ｐゴシック" charset="-128"/>
+              </a:defRPr>
+            </a:lvl2pPr>
+            <a:lvl3pPr eaLnBrk="0" hangingPunct="0">
+              <a:defRPr sz="2400" i="1">
+                <a:solidFill>
+                  <a:schemeClr val="tx1"/>
+                </a:solidFill>
+                <a:latin typeface="Arial" charset="0"/>
+                <a:ea typeface="ＭＳ Ｐゴシック" charset="-128"/>
+              </a:defRPr>
+            </a:lvl3pPr>
+            <a:lvl4pPr eaLnBrk="0" hangingPunct="0">
+              <a:defRPr sz="2400" i="1">
+                <a:solidFill>
+                  <a:schemeClr val="tx1"/>
+                </a:solidFill>
+                <a:latin typeface="Arial" charset="0"/>
+                <a:ea typeface="ＭＳ Ｐゴシック" charset="-128"/>
+              </a:defRPr>
+            </a:lvl4pPr>
+            <a:lvl5pPr eaLnBrk="0" hangingPunct="0">
+              <a:defRPr sz="2400" i="1">
+                <a:solidFill>
+                  <a:schemeClr val="tx1"/>
+                </a:solidFill>
+                <a:latin typeface="Arial" charset="0"/>
+                <a:ea typeface="ＭＳ Ｐゴシック" charset="-128"/>
+              </a:defRPr>
+            </a:lvl5pPr>
+            <a:lvl6pPr marL="457200" eaLnBrk="0" fontAlgn="base" hangingPunct="0">
+              <a:spcBef>
+                <a:spcPct val="0"/>
+              </a:spcBef>
+              <a:spcAft>
+                <a:spcPct val="0"/>
+              </a:spcAft>
+              <a:defRPr sz="2400" i="1">
+                <a:solidFill>
+                  <a:schemeClr val="tx1"/>
+                </a:solidFill>
+                <a:latin typeface="Arial" charset="0"/>
+                <a:ea typeface="ＭＳ Ｐゴシック" charset="-128"/>
+              </a:defRPr>
+            </a:lvl6pPr>
+            <a:lvl7pPr marL="914400" eaLnBrk="0" fontAlgn="base" hangingPunct="0">
+              <a:spcBef>
+                <a:spcPct val="0"/>
+              </a:spcBef>
+              <a:spcAft>
+                <a:spcPct val="0"/>
+              </a:spcAft>
+              <a:defRPr sz="2400" i="1">
+                <a:solidFill>
+                  <a:schemeClr val="tx1"/>
+                </a:solidFill>
+                <a:latin typeface="Arial" charset="0"/>
+                <a:ea typeface="ＭＳ Ｐゴシック" charset="-128"/>
+              </a:defRPr>
+            </a:lvl7pPr>
+            <a:lvl8pPr marL="1371600" eaLnBrk="0" fontAlgn="base" hangingPunct="0">
+              <a:spcBef>
+                <a:spcPct val="0"/>
+              </a:spcBef>
+              <a:spcAft>
+                <a:spcPct val="0"/>
+              </a:spcAft>
+              <a:defRPr sz="2400" i="1">
+                <a:solidFill>
+                  <a:schemeClr val="tx1"/>
+                </a:solidFill>
+                <a:latin typeface="Arial" charset="0"/>
+                <a:ea typeface="ＭＳ Ｐゴシック" charset="-128"/>
+              </a:defRPr>
+            </a:lvl8pPr>
+            <a:lvl9pPr marL="1828800" eaLnBrk="0" fontAlgn="base" hangingPunct="0">
+              <a:spcBef>
+                <a:spcPct val="0"/>
+              </a:spcBef>
+              <a:spcAft>
+                <a:spcPct val="0"/>
+              </a:spcAft>
+              <a:defRPr sz="2400" i="1">
+                <a:solidFill>
+                  <a:schemeClr val="tx1"/>
+                </a:solidFill>
+                <a:latin typeface="Arial" charset="0"/>
+                <a:ea typeface="ＭＳ Ｐゴシック" charset="-128"/>
+              </a:defRPr>
+            </a:lvl9pPr>
+          </a:lstStyle>
+          <a:p>
+            <a:pPr eaLnBrk="1" hangingPunct="1"/>
+            <a:r>
+              <a:rPr lang="en-US" altLang="x-none" sz="2000" b="1"/>
+              <a:t>Probability</a:t>
+            </a:r>
+          </a:p>
+        </p:txBody>
+      </p:sp>
+      <p:sp>
+        <p:nvSpPr>
+          <p:cNvPr id="124" name="Rectangle 127"/>
+          <p:cNvSpPr>
+            <a:spLocks noChangeArrowheads="1"/>
+          </p:cNvSpPr>
+          <p:nvPr/>
+        </p:nvSpPr>
+        <p:spPr bwMode="auto">
+          <a:xfrm>
+            <a:off x="1524000" y="0"/>
+            <a:ext cx="9144000" cy="641350"/>
+          </a:xfrm>
+          <a:prstGeom prst="rect">
+            <a:avLst/>
+          </a:prstGeom>
+          <a:noFill/>
+          <a:ln>
+            <a:noFill/>
+          </a:ln>
+          <a:extLst>
+            <a:ext uri="{909E8E84-426E-40DD-AFC4-6F175D3DCCD1}">
+              <a14:hiddenFill xmlns:a14="http://schemas.microsoft.com/office/drawing/2010/main">
+                <a:solidFill>
+                  <a:srgbClr val="FFFFFF"/>
+                </a:solidFill>
+              </a14:hiddenFill>
+            </a:ext>
+            <a:ext uri="{91240B29-F687-4F45-9708-019B960494DF}">
+              <a14:hiddenLine xmlns:a14="http://schemas.microsoft.com/office/drawing/2010/main" w="9525">
+                <a:solidFill>
+                  <a:srgbClr val="000000"/>
+                </a:solidFill>
+                <a:miter lim="800000"/>
+                <a:headEnd/>
+                <a:tailEnd/>
+              </a14:hiddenLine>
+            </a:ext>
+          </a:extLst>
+        </p:spPr>
+        <p:txBody>
+          <a:bodyPr>
+            <a:spAutoFit/>
+          </a:bodyPr>
+          <a:lstStyle>
+            <a:lvl1pPr eaLnBrk="0" hangingPunct="0">
+              <a:defRPr sz="2400" i="1">
+                <a:solidFill>
+                  <a:schemeClr val="tx1"/>
+                </a:solidFill>
+                <a:latin typeface="Arial" charset="0"/>
+                <a:ea typeface="ＭＳ Ｐゴシック" charset="-128"/>
+              </a:defRPr>
+            </a:lvl1pPr>
+            <a:lvl2pPr marL="37931725" indent="-37474525" eaLnBrk="0" hangingPunct="0">
+              <a:defRPr sz="2400" i="1">
+                <a:solidFill>
+                  <a:schemeClr val="tx1"/>
+                </a:solidFill>
+                <a:latin typeface="Arial" charset="0"/>
+                <a:ea typeface="ＭＳ Ｐゴシック" charset="-128"/>
+              </a:defRPr>
+            </a:lvl2pPr>
+            <a:lvl3pPr eaLnBrk="0" hangingPunct="0">
+              <a:defRPr sz="2400" i="1">
+                <a:solidFill>
+                  <a:schemeClr val="tx1"/>
+                </a:solidFill>
+                <a:latin typeface="Arial" charset="0"/>
+                <a:ea typeface="ＭＳ Ｐゴシック" charset="-128"/>
+              </a:defRPr>
+            </a:lvl3pPr>
+            <a:lvl4pPr eaLnBrk="0" hangingPunct="0">
+              <a:defRPr sz="2400" i="1">
+                <a:solidFill>
+                  <a:schemeClr val="tx1"/>
+                </a:solidFill>
+                <a:latin typeface="Arial" charset="0"/>
+                <a:ea typeface="ＭＳ Ｐゴシック" charset="-128"/>
+              </a:defRPr>
+            </a:lvl4pPr>
+            <a:lvl5pPr eaLnBrk="0" hangingPunct="0">
+              <a:defRPr sz="2400" i="1">
+                <a:solidFill>
+                  <a:schemeClr val="tx1"/>
+                </a:solidFill>
+                <a:latin typeface="Arial" charset="0"/>
+                <a:ea typeface="ＭＳ Ｐゴシック" charset="-128"/>
+              </a:defRPr>
+            </a:lvl5pPr>
+            <a:lvl6pPr marL="457200" eaLnBrk="0" fontAlgn="base" hangingPunct="0">
+              <a:spcBef>
+                <a:spcPct val="0"/>
+              </a:spcBef>
+              <a:spcAft>
+                <a:spcPct val="0"/>
+              </a:spcAft>
+              <a:defRPr sz="2400" i="1">
+                <a:solidFill>
+                  <a:schemeClr val="tx1"/>
+                </a:solidFill>
+                <a:latin typeface="Arial" charset="0"/>
+                <a:ea typeface="ＭＳ Ｐゴシック" charset="-128"/>
+              </a:defRPr>
+            </a:lvl6pPr>
+            <a:lvl7pPr marL="914400" eaLnBrk="0" fontAlgn="base" hangingPunct="0">
+              <a:spcBef>
+                <a:spcPct val="0"/>
+              </a:spcBef>
+              <a:spcAft>
+                <a:spcPct val="0"/>
+              </a:spcAft>
+              <a:defRPr sz="2400" i="1">
+                <a:solidFill>
+                  <a:schemeClr val="tx1"/>
+                </a:solidFill>
+                <a:latin typeface="Arial" charset="0"/>
+                <a:ea typeface="ＭＳ Ｐゴシック" charset="-128"/>
+              </a:defRPr>
+            </a:lvl7pPr>
+            <a:lvl8pPr marL="1371600" eaLnBrk="0" fontAlgn="base" hangingPunct="0">
+              <a:spcBef>
+                <a:spcPct val="0"/>
+              </a:spcBef>
+              <a:spcAft>
+                <a:spcPct val="0"/>
+              </a:spcAft>
+              <a:defRPr sz="2400" i="1">
+                <a:solidFill>
+                  <a:schemeClr val="tx1"/>
+                </a:solidFill>
+                <a:latin typeface="Arial" charset="0"/>
+                <a:ea typeface="ＭＳ Ｐゴシック" charset="-128"/>
+              </a:defRPr>
+            </a:lvl8pPr>
+            <a:lvl9pPr marL="1828800" eaLnBrk="0" fontAlgn="base" hangingPunct="0">
+              <a:spcBef>
+                <a:spcPct val="0"/>
+              </a:spcBef>
+              <a:spcAft>
+                <a:spcPct val="0"/>
+              </a:spcAft>
+              <a:defRPr sz="2400" i="1">
+                <a:solidFill>
+                  <a:schemeClr val="tx1"/>
+                </a:solidFill>
+                <a:latin typeface="Arial" charset="0"/>
+                <a:ea typeface="ＭＳ Ｐゴシック" charset="-128"/>
+              </a:defRPr>
+            </a:lvl9pPr>
+          </a:lstStyle>
+          <a:p>
+            <a:pPr eaLnBrk="1" hangingPunct="1"/>
+            <a:r>
+              <a:rPr lang="en-US" altLang="x-none" sz="3600" dirty="0"/>
+              <a:t>Bayes’ Theorem: Where are my Keys????</a:t>
+            </a:r>
+          </a:p>
+        </p:txBody>
+      </p:sp>
+    </p:spTree>
+    <p:extLst>
+      <p:ext uri="{BB962C8B-B14F-4D97-AF65-F5344CB8AC3E}">
+        <p14:creationId xmlns:p14="http://schemas.microsoft.com/office/powerpoint/2010/main" val="673168759"/>
+      </p:ext>
+    </p:extLst>
+  </p:cSld>
+  <p:clrMapOvr>
+    <a:masterClrMapping/>
+  </p:clrMapOvr>
+  <p:timing>
+    <p:tnLst>
+      <p:par>
+        <p:cTn id="1" dur="indefinite" restart="never" nodeType="tmRoot"/>
+      </p:par>
+    </p:tnLst>
+  </p:timing>
+</p:sld>
+</file>
+
+<file path=ppt/slides/slide2.xml><?xml version="1.0" encoding="utf-8"?>
 <p:sld xmlns:a="http://schemas.openxmlformats.org/drawingml/2006/main" xmlns:r="http://schemas.openxmlformats.org/officeDocument/2006/relationships" xmlns:p="http://schemas.openxmlformats.org/presentationml/2006/main">
   <p:cSld>
     <p:spTree>

</xml_diff>

<commit_message>
A few changes - mostly on Bayes intro
</commit_message>
<xml_diff>
--- a/activities/intro_to_bayes/BayesKeys.pptx
+++ b/activities/intro_to_bayes/BayesKeys.pptx
@@ -155,10 +155,9 @@
           </a:lstStyle>
           <a:p>
             <a:r>
-              <a:rPr lang="en-US" smtClean="0"/>
+              <a:rPr lang="en-US"/>
               <a:t>Click to edit Master title style</a:t>
             </a:r>
-            <a:endParaRPr lang="en-US"/>
           </a:p>
         </p:txBody>
       </p:sp>
@@ -220,10 +219,9 @@
           </a:lstStyle>
           <a:p>
             <a:r>
-              <a:rPr lang="en-US" smtClean="0"/>
+              <a:rPr lang="en-US"/>
               <a:t>Click to edit Master subtitle style</a:t>
             </a:r>
-            <a:endParaRPr lang="en-US"/>
           </a:p>
         </p:txBody>
       </p:sp>
@@ -244,7 +242,7 @@
           <a:p>
             <a:fld id="{9FC5ACED-37C2-5A48-B6D6-2482EC34C97B}" type="datetimeFigureOut">
               <a:rPr lang="en-US" smtClean="0"/>
-              <a:t>9/11/17</a:t>
+              <a:t>4/25/18</a:t>
             </a:fld>
             <a:endParaRPr lang="en-US"/>
           </a:p>
@@ -338,10 +336,9 @@
           <a:lstStyle/>
           <a:p>
             <a:r>
-              <a:rPr lang="en-US" smtClean="0"/>
+              <a:rPr lang="en-US"/>
               <a:t>Click to edit Master title style</a:t>
             </a:r>
-            <a:endParaRPr lang="en-US"/>
           </a:p>
         </p:txBody>
       </p:sp>
@@ -362,38 +359,37 @@
           <a:p>
             <a:pPr lvl="0"/>
             <a:r>
-              <a:rPr lang="en-US" smtClean="0"/>
+              <a:rPr lang="en-US"/>
               <a:t>Click to edit Master text styles</a:t>
             </a:r>
           </a:p>
           <a:p>
             <a:pPr lvl="1"/>
             <a:r>
-              <a:rPr lang="en-US" smtClean="0"/>
+              <a:rPr lang="en-US"/>
               <a:t>Second level</a:t>
             </a:r>
           </a:p>
           <a:p>
             <a:pPr lvl="2"/>
             <a:r>
-              <a:rPr lang="en-US" smtClean="0"/>
+              <a:rPr lang="en-US"/>
               <a:t>Third level</a:t>
             </a:r>
           </a:p>
           <a:p>
             <a:pPr lvl="3"/>
             <a:r>
-              <a:rPr lang="en-US" smtClean="0"/>
+              <a:rPr lang="en-US"/>
               <a:t>Fourth level</a:t>
             </a:r>
           </a:p>
           <a:p>
             <a:pPr lvl="4"/>
             <a:r>
-              <a:rPr lang="en-US" smtClean="0"/>
+              <a:rPr lang="en-US"/>
               <a:t>Fifth level</a:t>
             </a:r>
-            <a:endParaRPr lang="en-US"/>
           </a:p>
         </p:txBody>
       </p:sp>
@@ -414,7 +410,7 @@
           <a:p>
             <a:fld id="{9FC5ACED-37C2-5A48-B6D6-2482EC34C97B}" type="datetimeFigureOut">
               <a:rPr lang="en-US" smtClean="0"/>
-              <a:t>9/11/17</a:t>
+              <a:t>4/25/18</a:t>
             </a:fld>
             <a:endParaRPr lang="en-US"/>
           </a:p>
@@ -513,10 +509,9 @@
           <a:lstStyle/>
           <a:p>
             <a:r>
-              <a:rPr lang="en-US" smtClean="0"/>
+              <a:rPr lang="en-US"/>
               <a:t>Click to edit Master title style</a:t>
             </a:r>
-            <a:endParaRPr lang="en-US"/>
           </a:p>
         </p:txBody>
       </p:sp>
@@ -542,38 +537,37 @@
           <a:p>
             <a:pPr lvl="0"/>
             <a:r>
-              <a:rPr lang="en-US" smtClean="0"/>
+              <a:rPr lang="en-US"/>
               <a:t>Click to edit Master text styles</a:t>
             </a:r>
           </a:p>
           <a:p>
             <a:pPr lvl="1"/>
             <a:r>
-              <a:rPr lang="en-US" smtClean="0"/>
+              <a:rPr lang="en-US"/>
               <a:t>Second level</a:t>
             </a:r>
           </a:p>
           <a:p>
             <a:pPr lvl="2"/>
             <a:r>
-              <a:rPr lang="en-US" smtClean="0"/>
+              <a:rPr lang="en-US"/>
               <a:t>Third level</a:t>
             </a:r>
           </a:p>
           <a:p>
             <a:pPr lvl="3"/>
             <a:r>
-              <a:rPr lang="en-US" smtClean="0"/>
+              <a:rPr lang="en-US"/>
               <a:t>Fourth level</a:t>
             </a:r>
           </a:p>
           <a:p>
             <a:pPr lvl="4"/>
             <a:r>
-              <a:rPr lang="en-US" smtClean="0"/>
+              <a:rPr lang="en-US"/>
               <a:t>Fifth level</a:t>
             </a:r>
-            <a:endParaRPr lang="en-US"/>
           </a:p>
         </p:txBody>
       </p:sp>
@@ -594,7 +588,7 @@
           <a:p>
             <a:fld id="{9FC5ACED-37C2-5A48-B6D6-2482EC34C97B}" type="datetimeFigureOut">
               <a:rPr lang="en-US" smtClean="0"/>
-              <a:t>9/11/17</a:t>
+              <a:t>4/25/18</a:t>
             </a:fld>
             <a:endParaRPr lang="en-US"/>
           </a:p>
@@ -688,10 +682,9 @@
           <a:lstStyle/>
           <a:p>
             <a:r>
-              <a:rPr lang="en-US" smtClean="0"/>
+              <a:rPr lang="en-US"/>
               <a:t>Click to edit Master title style</a:t>
             </a:r>
-            <a:endParaRPr lang="en-US"/>
           </a:p>
         </p:txBody>
       </p:sp>
@@ -712,38 +705,37 @@
           <a:p>
             <a:pPr lvl="0"/>
             <a:r>
-              <a:rPr lang="en-US" smtClean="0"/>
+              <a:rPr lang="en-US"/>
               <a:t>Click to edit Master text styles</a:t>
             </a:r>
           </a:p>
           <a:p>
             <a:pPr lvl="1"/>
             <a:r>
-              <a:rPr lang="en-US" smtClean="0"/>
+              <a:rPr lang="en-US"/>
               <a:t>Second level</a:t>
             </a:r>
           </a:p>
           <a:p>
             <a:pPr lvl="2"/>
             <a:r>
-              <a:rPr lang="en-US" smtClean="0"/>
+              <a:rPr lang="en-US"/>
               <a:t>Third level</a:t>
             </a:r>
           </a:p>
           <a:p>
             <a:pPr lvl="3"/>
             <a:r>
-              <a:rPr lang="en-US" smtClean="0"/>
+              <a:rPr lang="en-US"/>
               <a:t>Fourth level</a:t>
             </a:r>
           </a:p>
           <a:p>
             <a:pPr lvl="4"/>
             <a:r>
-              <a:rPr lang="en-US" smtClean="0"/>
+              <a:rPr lang="en-US"/>
               <a:t>Fifth level</a:t>
             </a:r>
-            <a:endParaRPr lang="en-US"/>
           </a:p>
         </p:txBody>
       </p:sp>
@@ -764,7 +756,7 @@
           <a:p>
             <a:fld id="{9FC5ACED-37C2-5A48-B6D6-2482EC34C97B}" type="datetimeFigureOut">
               <a:rPr lang="en-US" smtClean="0"/>
-              <a:t>9/11/17</a:t>
+              <a:t>4/25/18</a:t>
             </a:fld>
             <a:endParaRPr lang="en-US"/>
           </a:p>
@@ -867,10 +859,9 @@
           </a:lstStyle>
           <a:p>
             <a:r>
-              <a:rPr lang="en-US" smtClean="0"/>
+              <a:rPr lang="en-US"/>
               <a:t>Click to edit Master title style</a:t>
             </a:r>
-            <a:endParaRPr lang="en-US"/>
           </a:p>
         </p:txBody>
       </p:sp>
@@ -987,7 +978,7 @@
           <a:p>
             <a:pPr lvl="0"/>
             <a:r>
-              <a:rPr lang="en-US" smtClean="0"/>
+              <a:rPr lang="en-US"/>
               <a:t>Click to edit Master text styles</a:t>
             </a:r>
           </a:p>
@@ -1010,7 +1001,7 @@
           <a:p>
             <a:fld id="{9FC5ACED-37C2-5A48-B6D6-2482EC34C97B}" type="datetimeFigureOut">
               <a:rPr lang="en-US" smtClean="0"/>
-              <a:t>9/11/17</a:t>
+              <a:t>4/25/18</a:t>
             </a:fld>
             <a:endParaRPr lang="en-US"/>
           </a:p>
@@ -1104,10 +1095,9 @@
           <a:lstStyle/>
           <a:p>
             <a:r>
-              <a:rPr lang="en-US" smtClean="0"/>
+              <a:rPr lang="en-US"/>
               <a:t>Click to edit Master title style</a:t>
             </a:r>
-            <a:endParaRPr lang="en-US"/>
           </a:p>
         </p:txBody>
       </p:sp>
@@ -1133,38 +1123,37 @@
           <a:p>
             <a:pPr lvl="0"/>
             <a:r>
-              <a:rPr lang="en-US" smtClean="0"/>
+              <a:rPr lang="en-US"/>
               <a:t>Click to edit Master text styles</a:t>
             </a:r>
           </a:p>
           <a:p>
             <a:pPr lvl="1"/>
             <a:r>
-              <a:rPr lang="en-US" smtClean="0"/>
+              <a:rPr lang="en-US"/>
               <a:t>Second level</a:t>
             </a:r>
           </a:p>
           <a:p>
             <a:pPr lvl="2"/>
             <a:r>
-              <a:rPr lang="en-US" smtClean="0"/>
+              <a:rPr lang="en-US"/>
               <a:t>Third level</a:t>
             </a:r>
           </a:p>
           <a:p>
             <a:pPr lvl="3"/>
             <a:r>
-              <a:rPr lang="en-US" smtClean="0"/>
+              <a:rPr lang="en-US"/>
               <a:t>Fourth level</a:t>
             </a:r>
           </a:p>
           <a:p>
             <a:pPr lvl="4"/>
             <a:r>
-              <a:rPr lang="en-US" smtClean="0"/>
+              <a:rPr lang="en-US"/>
               <a:t>Fifth level</a:t>
             </a:r>
-            <a:endParaRPr lang="en-US"/>
           </a:p>
         </p:txBody>
       </p:sp>
@@ -1190,38 +1179,37 @@
           <a:p>
             <a:pPr lvl="0"/>
             <a:r>
-              <a:rPr lang="en-US" smtClean="0"/>
+              <a:rPr lang="en-US"/>
               <a:t>Click to edit Master text styles</a:t>
             </a:r>
           </a:p>
           <a:p>
             <a:pPr lvl="1"/>
             <a:r>
-              <a:rPr lang="en-US" smtClean="0"/>
+              <a:rPr lang="en-US"/>
               <a:t>Second level</a:t>
             </a:r>
           </a:p>
           <a:p>
             <a:pPr lvl="2"/>
             <a:r>
-              <a:rPr lang="en-US" smtClean="0"/>
+              <a:rPr lang="en-US"/>
               <a:t>Third level</a:t>
             </a:r>
           </a:p>
           <a:p>
             <a:pPr lvl="3"/>
             <a:r>
-              <a:rPr lang="en-US" smtClean="0"/>
+              <a:rPr lang="en-US"/>
               <a:t>Fourth level</a:t>
             </a:r>
           </a:p>
           <a:p>
             <a:pPr lvl="4"/>
             <a:r>
-              <a:rPr lang="en-US" smtClean="0"/>
+              <a:rPr lang="en-US"/>
               <a:t>Fifth level</a:t>
             </a:r>
-            <a:endParaRPr lang="en-US"/>
           </a:p>
         </p:txBody>
       </p:sp>
@@ -1242,7 +1230,7 @@
           <a:p>
             <a:fld id="{9FC5ACED-37C2-5A48-B6D6-2482EC34C97B}" type="datetimeFigureOut">
               <a:rPr lang="en-US" smtClean="0"/>
-              <a:t>9/11/17</a:t>
+              <a:t>4/25/18</a:t>
             </a:fld>
             <a:endParaRPr lang="en-US"/>
           </a:p>
@@ -1341,10 +1329,9 @@
           <a:lstStyle/>
           <a:p>
             <a:r>
-              <a:rPr lang="en-US" smtClean="0"/>
+              <a:rPr lang="en-US"/>
               <a:t>Click to edit Master title style</a:t>
             </a:r>
-            <a:endParaRPr lang="en-US"/>
           </a:p>
         </p:txBody>
       </p:sp>
@@ -1407,7 +1394,7 @@
           <a:p>
             <a:pPr lvl="0"/>
             <a:r>
-              <a:rPr lang="en-US" smtClean="0"/>
+              <a:rPr lang="en-US"/>
               <a:t>Click to edit Master text styles</a:t>
             </a:r>
           </a:p>
@@ -1435,38 +1422,37 @@
           <a:p>
             <a:pPr lvl="0"/>
             <a:r>
-              <a:rPr lang="en-US" smtClean="0"/>
+              <a:rPr lang="en-US"/>
               <a:t>Click to edit Master text styles</a:t>
             </a:r>
           </a:p>
           <a:p>
             <a:pPr lvl="1"/>
             <a:r>
-              <a:rPr lang="en-US" smtClean="0"/>
+              <a:rPr lang="en-US"/>
               <a:t>Second level</a:t>
             </a:r>
           </a:p>
           <a:p>
             <a:pPr lvl="2"/>
             <a:r>
-              <a:rPr lang="en-US" smtClean="0"/>
+              <a:rPr lang="en-US"/>
               <a:t>Third level</a:t>
             </a:r>
           </a:p>
           <a:p>
             <a:pPr lvl="3"/>
             <a:r>
-              <a:rPr lang="en-US" smtClean="0"/>
+              <a:rPr lang="en-US"/>
               <a:t>Fourth level</a:t>
             </a:r>
           </a:p>
           <a:p>
             <a:pPr lvl="4"/>
             <a:r>
-              <a:rPr lang="en-US" smtClean="0"/>
+              <a:rPr lang="en-US"/>
               <a:t>Fifth level</a:t>
             </a:r>
-            <a:endParaRPr lang="en-US"/>
           </a:p>
         </p:txBody>
       </p:sp>
@@ -1529,7 +1515,7 @@
           <a:p>
             <a:pPr lvl="0"/>
             <a:r>
-              <a:rPr lang="en-US" smtClean="0"/>
+              <a:rPr lang="en-US"/>
               <a:t>Click to edit Master text styles</a:t>
             </a:r>
           </a:p>
@@ -1557,38 +1543,37 @@
           <a:p>
             <a:pPr lvl="0"/>
             <a:r>
-              <a:rPr lang="en-US" smtClean="0"/>
+              <a:rPr lang="en-US"/>
               <a:t>Click to edit Master text styles</a:t>
             </a:r>
           </a:p>
           <a:p>
             <a:pPr lvl="1"/>
             <a:r>
-              <a:rPr lang="en-US" smtClean="0"/>
+              <a:rPr lang="en-US"/>
               <a:t>Second level</a:t>
             </a:r>
           </a:p>
           <a:p>
             <a:pPr lvl="2"/>
             <a:r>
-              <a:rPr lang="en-US" smtClean="0"/>
+              <a:rPr lang="en-US"/>
               <a:t>Third level</a:t>
             </a:r>
           </a:p>
           <a:p>
             <a:pPr lvl="3"/>
             <a:r>
-              <a:rPr lang="en-US" smtClean="0"/>
+              <a:rPr lang="en-US"/>
               <a:t>Fourth level</a:t>
             </a:r>
           </a:p>
           <a:p>
             <a:pPr lvl="4"/>
             <a:r>
-              <a:rPr lang="en-US" smtClean="0"/>
+              <a:rPr lang="en-US"/>
               <a:t>Fifth level</a:t>
             </a:r>
-            <a:endParaRPr lang="en-US"/>
           </a:p>
         </p:txBody>
       </p:sp>
@@ -1609,7 +1594,7 @@
           <a:p>
             <a:fld id="{9FC5ACED-37C2-5A48-B6D6-2482EC34C97B}" type="datetimeFigureOut">
               <a:rPr lang="en-US" smtClean="0"/>
-              <a:t>9/11/17</a:t>
+              <a:t>4/25/18</a:t>
             </a:fld>
             <a:endParaRPr lang="en-US"/>
           </a:p>
@@ -1703,10 +1688,9 @@
           <a:lstStyle/>
           <a:p>
             <a:r>
-              <a:rPr lang="en-US" smtClean="0"/>
+              <a:rPr lang="en-US"/>
               <a:t>Click to edit Master title style</a:t>
             </a:r>
-            <a:endParaRPr lang="en-US"/>
           </a:p>
         </p:txBody>
       </p:sp>
@@ -1727,7 +1711,7 @@
           <a:p>
             <a:fld id="{9FC5ACED-37C2-5A48-B6D6-2482EC34C97B}" type="datetimeFigureOut">
               <a:rPr lang="en-US" smtClean="0"/>
-              <a:t>9/11/17</a:t>
+              <a:t>4/25/18</a:t>
             </a:fld>
             <a:endParaRPr lang="en-US"/>
           </a:p>
@@ -1822,7 +1806,7 @@
           <a:p>
             <a:fld id="{9FC5ACED-37C2-5A48-B6D6-2482EC34C97B}" type="datetimeFigureOut">
               <a:rPr lang="en-US" smtClean="0"/>
-              <a:t>9/11/17</a:t>
+              <a:t>4/25/18</a:t>
             </a:fld>
             <a:endParaRPr lang="en-US"/>
           </a:p>
@@ -1925,10 +1909,9 @@
           </a:lstStyle>
           <a:p>
             <a:r>
-              <a:rPr lang="en-US" smtClean="0"/>
+              <a:rPr lang="en-US"/>
               <a:t>Click to edit Master title style</a:t>
             </a:r>
-            <a:endParaRPr lang="en-US"/>
           </a:p>
         </p:txBody>
       </p:sp>
@@ -1982,38 +1965,37 @@
           <a:p>
             <a:pPr lvl="0"/>
             <a:r>
-              <a:rPr lang="en-US" smtClean="0"/>
+              <a:rPr lang="en-US"/>
               <a:t>Click to edit Master text styles</a:t>
             </a:r>
           </a:p>
           <a:p>
             <a:pPr lvl="1"/>
             <a:r>
-              <a:rPr lang="en-US" smtClean="0"/>
+              <a:rPr lang="en-US"/>
               <a:t>Second level</a:t>
             </a:r>
           </a:p>
           <a:p>
             <a:pPr lvl="2"/>
             <a:r>
-              <a:rPr lang="en-US" smtClean="0"/>
+              <a:rPr lang="en-US"/>
               <a:t>Third level</a:t>
             </a:r>
           </a:p>
           <a:p>
             <a:pPr lvl="3"/>
             <a:r>
-              <a:rPr lang="en-US" smtClean="0"/>
+              <a:rPr lang="en-US"/>
               <a:t>Fourth level</a:t>
             </a:r>
           </a:p>
           <a:p>
             <a:pPr lvl="4"/>
             <a:r>
-              <a:rPr lang="en-US" smtClean="0"/>
+              <a:rPr lang="en-US"/>
               <a:t>Fifth level</a:t>
             </a:r>
-            <a:endParaRPr lang="en-US"/>
           </a:p>
         </p:txBody>
       </p:sp>
@@ -2076,7 +2058,7 @@
           <a:p>
             <a:pPr lvl="0"/>
             <a:r>
-              <a:rPr lang="en-US" smtClean="0"/>
+              <a:rPr lang="en-US"/>
               <a:t>Click to edit Master text styles</a:t>
             </a:r>
           </a:p>
@@ -2099,7 +2081,7 @@
           <a:p>
             <a:fld id="{9FC5ACED-37C2-5A48-B6D6-2482EC34C97B}" type="datetimeFigureOut">
               <a:rPr lang="en-US" smtClean="0"/>
-              <a:t>9/11/17</a:t>
+              <a:t>4/25/18</a:t>
             </a:fld>
             <a:endParaRPr lang="en-US"/>
           </a:p>
@@ -2202,10 +2184,9 @@
           </a:lstStyle>
           <a:p>
             <a:r>
-              <a:rPr lang="en-US" smtClean="0"/>
+              <a:rPr lang="en-US"/>
               <a:t>Click to edit Master title style</a:t>
             </a:r>
-            <a:endParaRPr lang="en-US"/>
           </a:p>
         </p:txBody>
       </p:sp>
@@ -2329,7 +2310,7 @@
           <a:p>
             <a:pPr lvl="0"/>
             <a:r>
-              <a:rPr lang="en-US" smtClean="0"/>
+              <a:rPr lang="en-US"/>
               <a:t>Click to edit Master text styles</a:t>
             </a:r>
           </a:p>
@@ -2352,7 +2333,7 @@
           <a:p>
             <a:fld id="{9FC5ACED-37C2-5A48-B6D6-2482EC34C97B}" type="datetimeFigureOut">
               <a:rPr lang="en-US" smtClean="0"/>
-              <a:t>9/11/17</a:t>
+              <a:t>4/25/18</a:t>
             </a:fld>
             <a:endParaRPr lang="en-US"/>
           </a:p>
@@ -2461,10 +2442,9 @@
           <a:lstStyle/>
           <a:p>
             <a:r>
-              <a:rPr lang="en-US" smtClean="0"/>
+              <a:rPr lang="en-US"/>
               <a:t>Click to edit Master title style</a:t>
             </a:r>
-            <a:endParaRPr lang="en-US"/>
           </a:p>
         </p:txBody>
       </p:sp>
@@ -2495,38 +2475,37 @@
           <a:p>
             <a:pPr lvl="0"/>
             <a:r>
-              <a:rPr lang="en-US" smtClean="0"/>
+              <a:rPr lang="en-US"/>
               <a:t>Click to edit Master text styles</a:t>
             </a:r>
           </a:p>
           <a:p>
             <a:pPr lvl="1"/>
             <a:r>
-              <a:rPr lang="en-US" smtClean="0"/>
+              <a:rPr lang="en-US"/>
               <a:t>Second level</a:t>
             </a:r>
           </a:p>
           <a:p>
             <a:pPr lvl="2"/>
             <a:r>
-              <a:rPr lang="en-US" smtClean="0"/>
+              <a:rPr lang="en-US"/>
               <a:t>Third level</a:t>
             </a:r>
           </a:p>
           <a:p>
             <a:pPr lvl="3"/>
             <a:r>
-              <a:rPr lang="en-US" smtClean="0"/>
+              <a:rPr lang="en-US"/>
               <a:t>Fourth level</a:t>
             </a:r>
           </a:p>
           <a:p>
             <a:pPr lvl="4"/>
             <a:r>
-              <a:rPr lang="en-US" smtClean="0"/>
+              <a:rPr lang="en-US"/>
               <a:t>Fifth level</a:t>
             </a:r>
-            <a:endParaRPr lang="en-US"/>
           </a:p>
         </p:txBody>
       </p:sp>
@@ -2565,7 +2544,7 @@
           <a:p>
             <a:fld id="{9FC5ACED-37C2-5A48-B6D6-2482EC34C97B}" type="datetimeFigureOut">
               <a:rPr lang="en-US" smtClean="0"/>
-              <a:t>9/11/17</a:t>
+              <a:t>4/25/18</a:t>
             </a:fld>
             <a:endParaRPr lang="en-US"/>
           </a:p>
@@ -5262,13 +5241,6 @@
   <p:clrMapOvr>
     <a:masterClrMapping/>
   </p:clrMapOvr>
-  <p:timing>
-    <p:tnLst>
-      <p:par>
-        <p:cTn id="1" dur="indefinite" restart="never" nodeType="tmRoot"/>
-      </p:par>
-    </p:tnLst>
-  </p:timing>
 </p:sld>
 </file>
 

</xml_diff>